<commit_message>
Adding greeting page and interval layer.
</commit_message>
<xml_diff>
--- a/WheelOSDtest/StimulusPNG.pptx
+++ b/WheelOSDtest/StimulusPNG.pptx
@@ -5,7 +5,7 @@
     <p:sldMasterId id="2147483660" r:id="rId1"/>
   </p:sldMasterIdLst>
   <p:notesMasterIdLst>
-    <p:notesMasterId r:id="rId14"/>
+    <p:notesMasterId r:id="rId16"/>
   </p:notesMasterIdLst>
   <p:sldIdLst>
     <p:sldId id="256" r:id="rId2"/>
@@ -20,6 +20,8 @@
     <p:sldId id="265" r:id="rId11"/>
     <p:sldId id="266" r:id="rId12"/>
     <p:sldId id="267" r:id="rId13"/>
+    <p:sldId id="268" r:id="rId14"/>
+    <p:sldId id="269" r:id="rId15"/>
   </p:sldIdLst>
   <p:sldSz cx="9144000" cy="6858000" type="screen4x3"/>
   <p:notesSz cx="6858000" cy="9144000"/>
@@ -118,6 +120,11 @@
       </a:defRPr>
     </a:lvl9pPr>
   </p:defaultTextStyle>
+  <p:extLst>
+    <p:ext uri="{EFAFB233-063F-42B5-8137-9DF3F51BA10A}">
+      <p15:sldGuideLst xmlns:p15="http://schemas.microsoft.com/office/powerpoint/2012/main"/>
+    </p:ext>
+  </p:extLst>
 </p:presentation>
 </file>
 
@@ -203,7 +210,7 @@
           <a:p>
             <a:fld id="{F2BFC798-CD41-8F4D-B58F-44B3A40DE107}" type="datetimeFigureOut">
               <a:rPr lang="en-TW" smtClean="0"/>
-              <a:t>2020/3/27</a:t>
+              <a:t>2020/4/14</a:t>
             </a:fld>
             <a:endParaRPr lang="en-TW"/>
           </a:p>
@@ -471,6 +478,90 @@
 </p:notesMaster>
 </file>
 
+<file path=ppt/notesSlides/notesSlide1.xml><?xml version="1.0" encoding="utf-8"?>
+<p:notes xmlns:a="http://schemas.openxmlformats.org/drawingml/2006/main" xmlns:r="http://schemas.openxmlformats.org/officeDocument/2006/relationships" xmlns:p="http://schemas.openxmlformats.org/presentationml/2006/main">
+  <p:cSld>
+    <p:spTree>
+      <p:nvGrpSpPr>
+        <p:cNvPr id="1" name=""/>
+        <p:cNvGrpSpPr/>
+        <p:nvPr/>
+      </p:nvGrpSpPr>
+      <p:grpSpPr>
+        <a:xfrm>
+          <a:off x="0" y="0"/>
+          <a:ext cx="0" cy="0"/>
+          <a:chOff x="0" y="0"/>
+          <a:chExt cx="0" cy="0"/>
+        </a:xfrm>
+      </p:grpSpPr>
+      <p:sp>
+        <p:nvSpPr>
+          <p:cNvPr id="2" name="Slide Image Placeholder 1"/>
+          <p:cNvSpPr>
+            <a:spLocks noGrp="1" noRot="1" noChangeAspect="1"/>
+          </p:cNvSpPr>
+          <p:nvPr>
+            <p:ph type="sldImg"/>
+          </p:nvPr>
+        </p:nvSpPr>
+        <p:spPr/>
+      </p:sp>
+      <p:sp>
+        <p:nvSpPr>
+          <p:cNvPr id="3" name="Notes Placeholder 2"/>
+          <p:cNvSpPr>
+            <a:spLocks noGrp="1"/>
+          </p:cNvSpPr>
+          <p:nvPr>
+            <p:ph type="body" idx="1"/>
+          </p:nvPr>
+        </p:nvSpPr>
+        <p:spPr/>
+        <p:txBody>
+          <a:bodyPr/>
+          <a:lstStyle/>
+          <a:p>
+            <a:endParaRPr lang="en-TW" dirty="0"/>
+          </a:p>
+        </p:txBody>
+      </p:sp>
+      <p:sp>
+        <p:nvSpPr>
+          <p:cNvPr id="4" name="Slide Number Placeholder 3"/>
+          <p:cNvSpPr>
+            <a:spLocks noGrp="1"/>
+          </p:cNvSpPr>
+          <p:nvPr>
+            <p:ph type="sldNum" sz="quarter" idx="5"/>
+          </p:nvPr>
+        </p:nvSpPr>
+        <p:spPr/>
+        <p:txBody>
+          <a:bodyPr/>
+          <a:lstStyle/>
+          <a:p>
+            <a:fld id="{354FE729-320E-644F-90B6-73DCFE34B7C9}" type="slidenum">
+              <a:rPr lang="en-TW" smtClean="0"/>
+              <a:t>11</a:t>
+            </a:fld>
+            <a:endParaRPr lang="en-TW"/>
+          </a:p>
+        </p:txBody>
+      </p:sp>
+    </p:spTree>
+    <p:extLst>
+      <p:ext uri="{BB962C8B-B14F-4D97-AF65-F5344CB8AC3E}">
+        <p14:creationId xmlns:p14="http://schemas.microsoft.com/office/powerpoint/2010/main" val="4009893387"/>
+      </p:ext>
+    </p:extLst>
+  </p:cSld>
+  <p:clrMapOvr>
+    <a:masterClrMapping/>
+  </p:clrMapOvr>
+</p:notes>
+</file>
+
 <file path=ppt/slideLayouts/slideLayout1.xml><?xml version="1.0" encoding="utf-8"?>
 <p:sldLayout xmlns:a="http://schemas.openxmlformats.org/drawingml/2006/main" xmlns:r="http://schemas.openxmlformats.org/officeDocument/2006/relationships" xmlns:p="http://schemas.openxmlformats.org/presentationml/2006/main" type="title" preserve="1">
   <p:cSld name="Title Slide">
@@ -602,7 +693,7 @@
           <a:p>
             <a:fld id="{CC65E4BC-1554-EE47-8BC3-016EB7E374AC}" type="datetimeFigureOut">
               <a:rPr lang="en-TW" smtClean="0"/>
-              <a:t>2020/3/27</a:t>
+              <a:t>2020/4/14</a:t>
             </a:fld>
             <a:endParaRPr lang="en-TW"/>
           </a:p>
@@ -772,7 +863,7 @@
           <a:p>
             <a:fld id="{CC65E4BC-1554-EE47-8BC3-016EB7E374AC}" type="datetimeFigureOut">
               <a:rPr lang="en-TW" smtClean="0"/>
-              <a:t>2020/3/27</a:t>
+              <a:t>2020/4/14</a:t>
             </a:fld>
             <a:endParaRPr lang="en-TW"/>
           </a:p>
@@ -952,7 +1043,7 @@
           <a:p>
             <a:fld id="{CC65E4BC-1554-EE47-8BC3-016EB7E374AC}" type="datetimeFigureOut">
               <a:rPr lang="en-TW" smtClean="0"/>
-              <a:t>2020/3/27</a:t>
+              <a:t>2020/4/14</a:t>
             </a:fld>
             <a:endParaRPr lang="en-TW"/>
           </a:p>
@@ -1122,7 +1213,7 @@
           <a:p>
             <a:fld id="{CC65E4BC-1554-EE47-8BC3-016EB7E374AC}" type="datetimeFigureOut">
               <a:rPr lang="en-TW" smtClean="0"/>
-              <a:t>2020/3/27</a:t>
+              <a:t>2020/4/14</a:t>
             </a:fld>
             <a:endParaRPr lang="en-TW"/>
           </a:p>
@@ -1366,7 +1457,7 @@
           <a:p>
             <a:fld id="{CC65E4BC-1554-EE47-8BC3-016EB7E374AC}" type="datetimeFigureOut">
               <a:rPr lang="en-TW" smtClean="0"/>
-              <a:t>2020/3/27</a:t>
+              <a:t>2020/4/14</a:t>
             </a:fld>
             <a:endParaRPr lang="en-TW"/>
           </a:p>
@@ -1598,7 +1689,7 @@
           <a:p>
             <a:fld id="{CC65E4BC-1554-EE47-8BC3-016EB7E374AC}" type="datetimeFigureOut">
               <a:rPr lang="en-TW" smtClean="0"/>
-              <a:t>2020/3/27</a:t>
+              <a:t>2020/4/14</a:t>
             </a:fld>
             <a:endParaRPr lang="en-TW"/>
           </a:p>
@@ -1965,7 +2056,7 @@
           <a:p>
             <a:fld id="{CC65E4BC-1554-EE47-8BC3-016EB7E374AC}" type="datetimeFigureOut">
               <a:rPr lang="en-TW" smtClean="0"/>
-              <a:t>2020/3/27</a:t>
+              <a:t>2020/4/14</a:t>
             </a:fld>
             <a:endParaRPr lang="en-TW"/>
           </a:p>
@@ -2083,7 +2174,7 @@
           <a:p>
             <a:fld id="{CC65E4BC-1554-EE47-8BC3-016EB7E374AC}" type="datetimeFigureOut">
               <a:rPr lang="en-TW" smtClean="0"/>
-              <a:t>2020/3/27</a:t>
+              <a:t>2020/4/14</a:t>
             </a:fld>
             <a:endParaRPr lang="en-TW"/>
           </a:p>
@@ -2178,7 +2269,7 @@
           <a:p>
             <a:fld id="{CC65E4BC-1554-EE47-8BC3-016EB7E374AC}" type="datetimeFigureOut">
               <a:rPr lang="en-TW" smtClean="0"/>
-              <a:t>2020/3/27</a:t>
+              <a:t>2020/4/14</a:t>
             </a:fld>
             <a:endParaRPr lang="en-TW"/>
           </a:p>
@@ -2455,7 +2546,7 @@
           <a:p>
             <a:fld id="{CC65E4BC-1554-EE47-8BC3-016EB7E374AC}" type="datetimeFigureOut">
               <a:rPr lang="en-TW" smtClean="0"/>
-              <a:t>2020/3/27</a:t>
+              <a:t>2020/4/14</a:t>
             </a:fld>
             <a:endParaRPr lang="en-TW"/>
           </a:p>
@@ -2712,7 +2803,7 @@
           <a:p>
             <a:fld id="{CC65E4BC-1554-EE47-8BC3-016EB7E374AC}" type="datetimeFigureOut">
               <a:rPr lang="en-TW" smtClean="0"/>
-              <a:t>2020/3/27</a:t>
+              <a:t>2020/4/14</a:t>
             </a:fld>
             <a:endParaRPr lang="en-TW"/>
           </a:p>
@@ -2778,7 +2869,7 @@
   <p:cSld>
     <p:bg>
       <p:bgRef idx="1001">
-        <a:schemeClr val="bg1"/>
+        <a:schemeClr val="bg2"/>
       </p:bgRef>
     </p:bg>
     <p:spTree>
@@ -2925,7 +3016,7 @@
           <a:p>
             <a:fld id="{CC65E4BC-1554-EE47-8BC3-016EB7E374AC}" type="datetimeFigureOut">
               <a:rPr lang="en-TW" smtClean="0"/>
-              <a:t>2020/3/27</a:t>
+              <a:t>2020/4/14</a:t>
             </a:fld>
             <a:endParaRPr lang="en-TW"/>
           </a:p>
@@ -3330,96 +3421,115 @@
           <a:chExt cx="0" cy="0"/>
         </a:xfrm>
       </p:grpSpPr>
-      <p:sp>
-        <p:nvSpPr>
-          <p:cNvPr id="5" name="Rectangle 4">
+      <p:grpSp>
+        <p:nvGrpSpPr>
+          <p:cNvPr id="2" name="Group 1">
             <a:extLst>
               <a:ext uri="{FF2B5EF4-FFF2-40B4-BE49-F238E27FC236}">
-                <a16:creationId xmlns:a16="http://schemas.microsoft.com/office/drawing/2014/main" id="{F4841DAB-6795-AC4E-959E-8307ED2F1058}"/>
+                <a16:creationId xmlns:a16="http://schemas.microsoft.com/office/drawing/2014/main" id="{5645E62C-A098-2247-96E9-D41A2B940832}"/>
               </a:ext>
             </a:extLst>
           </p:cNvPr>
-          <p:cNvSpPr/>
+          <p:cNvGrpSpPr/>
           <p:nvPr/>
-        </p:nvSpPr>
-        <p:spPr>
+        </p:nvGrpSpPr>
+        <p:grpSpPr>
           <a:xfrm>
-            <a:off x="4114800" y="2501348"/>
-            <a:ext cx="914400" cy="470452"/>
+            <a:off x="3918857" y="2600503"/>
+            <a:ext cx="1306286" cy="1656994"/>
+            <a:chOff x="3918857" y="2229206"/>
+            <a:chExt cx="1306286" cy="1656994"/>
           </a:xfrm>
-          <a:prstGeom prst="rect">
-            <a:avLst/>
-          </a:prstGeom>
-          <a:solidFill>
-            <a:schemeClr val="bg1"/>
-          </a:solidFill>
-          <a:ln>
+        </p:grpSpPr>
+        <p:pic>
+          <p:nvPicPr>
+            <p:cNvPr id="7" name="Graphic 6" descr="Line arrow Straight">
+              <a:extLst>
+                <a:ext uri="{FF2B5EF4-FFF2-40B4-BE49-F238E27FC236}">
+                  <a16:creationId xmlns:a16="http://schemas.microsoft.com/office/drawing/2014/main" id="{221EEDDD-BC39-D54C-8A20-6D0CBAA89E8A}"/>
+                </a:ext>
+              </a:extLst>
+            </p:cNvPr>
+            <p:cNvPicPr>
+              <a:picLocks noChangeAspect="1"/>
+            </p:cNvPicPr>
+            <p:nvPr/>
+          </p:nvPicPr>
+          <p:blipFill>
+            <a:blip r:embed="rId2">
+              <a:extLst>
+                <a:ext uri="{96DAC541-7B7A-43D3-8B79-37D633B846F1}">
+                  <asvg:svgBlip xmlns:asvg="http://schemas.microsoft.com/office/drawing/2016/SVG/main" r:embed="rId3"/>
+                </a:ext>
+              </a:extLst>
+            </a:blip>
+            <a:stretch>
+              <a:fillRect/>
+            </a:stretch>
+          </p:blipFill>
+          <p:spPr>
+            <a:xfrm>
+              <a:off x="4114800" y="2971800"/>
+              <a:ext cx="914400" cy="914400"/>
+            </a:xfrm>
+            <a:prstGeom prst="rect">
+              <a:avLst/>
+            </a:prstGeom>
+          </p:spPr>
+        </p:pic>
+        <p:sp>
+          <p:nvSpPr>
+            <p:cNvPr id="4" name="Rectangle 3">
+              <a:extLst>
+                <a:ext uri="{FF2B5EF4-FFF2-40B4-BE49-F238E27FC236}">
+                  <a16:creationId xmlns:a16="http://schemas.microsoft.com/office/drawing/2014/main" id="{35A5ADC6-8CD7-2842-82AF-2C52C19755C1}"/>
+                </a:ext>
+              </a:extLst>
+            </p:cNvPr>
+            <p:cNvSpPr/>
+            <p:nvPr/>
+          </p:nvSpPr>
+          <p:spPr>
+            <a:xfrm>
+              <a:off x="3918857" y="2229206"/>
+              <a:ext cx="1306286" cy="470452"/>
+            </a:xfrm>
+            <a:prstGeom prst="rect">
+              <a:avLst/>
+            </a:prstGeom>
             <a:noFill/>
-          </a:ln>
-        </p:spPr>
-        <p:style>
-          <a:lnRef idx="1">
-            <a:schemeClr val="accent3"/>
-          </a:lnRef>
-          <a:fillRef idx="2">
-            <a:schemeClr val="accent3"/>
-          </a:fillRef>
-          <a:effectRef idx="1">
-            <a:schemeClr val="accent3"/>
-          </a:effectRef>
-          <a:fontRef idx="minor">
-            <a:schemeClr val="dk1"/>
-          </a:fontRef>
-        </p:style>
-        <p:txBody>
-          <a:bodyPr rtlCol="0" anchor="ctr"/>
-          <a:lstStyle/>
-          <a:p>
-            <a:pPr algn="ctr"/>
-            <a:r>
-              <a:rPr lang="zh-CN" altLang="en-US" dirty="0"/>
-              <a:t>滾輪</a:t>
-            </a:r>
-            <a:endParaRPr lang="en-US" altLang="zh-CN" dirty="0"/>
-          </a:p>
-        </p:txBody>
-      </p:sp>
-      <p:pic>
-        <p:nvPicPr>
-          <p:cNvPr id="7" name="Graphic 6" descr="Line arrow Straight">
-            <a:extLst>
-              <a:ext uri="{FF2B5EF4-FFF2-40B4-BE49-F238E27FC236}">
-                <a16:creationId xmlns:a16="http://schemas.microsoft.com/office/drawing/2014/main" id="{221EEDDD-BC39-D54C-8A20-6D0CBAA89E8A}"/>
-              </a:ext>
-            </a:extLst>
-          </p:cNvPr>
-          <p:cNvPicPr>
-            <a:picLocks noChangeAspect="1"/>
-          </p:cNvPicPr>
-          <p:nvPr/>
-        </p:nvPicPr>
-        <p:blipFill>
-          <a:blip r:embed="rId2">
-            <a:extLst>
-              <a:ext uri="{96DAC541-7B7A-43D3-8B79-37D633B846F1}">
-                <asvg:svgBlip xmlns:asvg="http://schemas.microsoft.com/office/drawing/2016/SVG/main" r:embed="rId3"/>
-              </a:ext>
-            </a:extLst>
-          </a:blip>
-          <a:stretch>
-            <a:fillRect/>
-          </a:stretch>
-        </p:blipFill>
-        <p:spPr>
-          <a:xfrm>
-            <a:off x="4114800" y="2971800"/>
-            <a:ext cx="914400" cy="914400"/>
-          </a:xfrm>
-          <a:prstGeom prst="rect">
-            <a:avLst/>
-          </a:prstGeom>
-        </p:spPr>
-      </p:pic>
+            <a:ln>
+              <a:noFill/>
+            </a:ln>
+          </p:spPr>
+          <p:style>
+            <a:lnRef idx="1">
+              <a:schemeClr val="accent3"/>
+            </a:lnRef>
+            <a:fillRef idx="2">
+              <a:schemeClr val="accent3"/>
+            </a:fillRef>
+            <a:effectRef idx="1">
+              <a:schemeClr val="accent3"/>
+            </a:effectRef>
+            <a:fontRef idx="minor">
+              <a:schemeClr val="dk1"/>
+            </a:fontRef>
+          </p:style>
+          <p:txBody>
+            <a:bodyPr rtlCol="0" anchor="ctr"/>
+            <a:lstStyle/>
+            <a:p>
+              <a:pPr algn="ctr"/>
+              <a:r>
+                <a:rPr lang="zh-CN" altLang="en-US" sz="3600" dirty="0"/>
+                <a:t>滾輪</a:t>
+              </a:r>
+              <a:endParaRPr lang="en-US" altLang="zh-CN" sz="3600" dirty="0"/>
+            </a:p>
+          </p:txBody>
+        </p:sp>
+      </p:grpSp>
     </p:spTree>
     <p:extLst>
       <p:ext uri="{BB962C8B-B14F-4D97-AF65-F5344CB8AC3E}">
@@ -3450,96 +3560,115 @@
           <a:chExt cx="0" cy="0"/>
         </a:xfrm>
       </p:grpSpPr>
-      <p:sp>
-        <p:nvSpPr>
-          <p:cNvPr id="5" name="Rectangle 4">
+      <p:grpSp>
+        <p:nvGrpSpPr>
+          <p:cNvPr id="2" name="Group 1">
             <a:extLst>
               <a:ext uri="{FF2B5EF4-FFF2-40B4-BE49-F238E27FC236}">
-                <a16:creationId xmlns:a16="http://schemas.microsoft.com/office/drawing/2014/main" id="{F4841DAB-6795-AC4E-959E-8307ED2F1058}"/>
+                <a16:creationId xmlns:a16="http://schemas.microsoft.com/office/drawing/2014/main" id="{3D6E4817-2D7B-6743-A760-BEB39423B740}"/>
               </a:ext>
             </a:extLst>
           </p:cNvPr>
-          <p:cNvSpPr/>
+          <p:cNvGrpSpPr/>
           <p:nvPr/>
-        </p:nvSpPr>
-        <p:spPr>
+        </p:nvGrpSpPr>
+        <p:grpSpPr>
           <a:xfrm>
-            <a:off x="4114800" y="2501348"/>
-            <a:ext cx="914400" cy="470452"/>
+            <a:off x="3918857" y="2600503"/>
+            <a:ext cx="1306286" cy="1656994"/>
+            <a:chOff x="3918857" y="2229206"/>
+            <a:chExt cx="1306286" cy="1656994"/>
           </a:xfrm>
-          <a:prstGeom prst="rect">
-            <a:avLst/>
-          </a:prstGeom>
-          <a:solidFill>
-            <a:schemeClr val="bg1"/>
-          </a:solidFill>
-          <a:ln>
+        </p:grpSpPr>
+        <p:pic>
+          <p:nvPicPr>
+            <p:cNvPr id="7" name="Graphic 6" descr="Line arrow Straight">
+              <a:extLst>
+                <a:ext uri="{FF2B5EF4-FFF2-40B4-BE49-F238E27FC236}">
+                  <a16:creationId xmlns:a16="http://schemas.microsoft.com/office/drawing/2014/main" id="{221EEDDD-BC39-D54C-8A20-6D0CBAA89E8A}"/>
+                </a:ext>
+              </a:extLst>
+            </p:cNvPr>
+            <p:cNvPicPr>
+              <a:picLocks noChangeAspect="1"/>
+            </p:cNvPicPr>
+            <p:nvPr/>
+          </p:nvPicPr>
+          <p:blipFill>
+            <a:blip r:embed="rId2">
+              <a:extLst>
+                <a:ext uri="{96DAC541-7B7A-43D3-8B79-37D633B846F1}">
+                  <asvg:svgBlip xmlns:asvg="http://schemas.microsoft.com/office/drawing/2016/SVG/main" r:embed="rId3"/>
+                </a:ext>
+              </a:extLst>
+            </a:blip>
+            <a:stretch>
+              <a:fillRect/>
+            </a:stretch>
+          </p:blipFill>
+          <p:spPr>
+            <a:xfrm rot="16200000">
+              <a:off x="4114800" y="2971800"/>
+              <a:ext cx="914400" cy="914400"/>
+            </a:xfrm>
+            <a:prstGeom prst="rect">
+              <a:avLst/>
+            </a:prstGeom>
+          </p:spPr>
+        </p:pic>
+        <p:sp>
+          <p:nvSpPr>
+            <p:cNvPr id="4" name="Rectangle 3">
+              <a:extLst>
+                <a:ext uri="{FF2B5EF4-FFF2-40B4-BE49-F238E27FC236}">
+                  <a16:creationId xmlns:a16="http://schemas.microsoft.com/office/drawing/2014/main" id="{2F695D18-705E-AB45-A515-2642987C99F3}"/>
+                </a:ext>
+              </a:extLst>
+            </p:cNvPr>
+            <p:cNvSpPr/>
+            <p:nvPr/>
+          </p:nvSpPr>
+          <p:spPr>
+            <a:xfrm>
+              <a:off x="3918857" y="2229206"/>
+              <a:ext cx="1306286" cy="470452"/>
+            </a:xfrm>
+            <a:prstGeom prst="rect">
+              <a:avLst/>
+            </a:prstGeom>
             <a:noFill/>
-          </a:ln>
-        </p:spPr>
-        <p:style>
-          <a:lnRef idx="1">
-            <a:schemeClr val="accent3"/>
-          </a:lnRef>
-          <a:fillRef idx="2">
-            <a:schemeClr val="accent3"/>
-          </a:fillRef>
-          <a:effectRef idx="1">
-            <a:schemeClr val="accent3"/>
-          </a:effectRef>
-          <a:fontRef idx="minor">
-            <a:schemeClr val="dk1"/>
-          </a:fontRef>
-        </p:style>
-        <p:txBody>
-          <a:bodyPr rtlCol="0" anchor="ctr"/>
-          <a:lstStyle/>
-          <a:p>
-            <a:pPr algn="ctr"/>
-            <a:r>
-              <a:rPr lang="zh-CN" altLang="en-US" dirty="0"/>
-              <a:t>搖桿</a:t>
-            </a:r>
-            <a:endParaRPr lang="en-US" altLang="zh-CN" dirty="0"/>
-          </a:p>
-        </p:txBody>
-      </p:sp>
-      <p:pic>
-        <p:nvPicPr>
-          <p:cNvPr id="7" name="Graphic 6" descr="Line arrow Straight">
-            <a:extLst>
-              <a:ext uri="{FF2B5EF4-FFF2-40B4-BE49-F238E27FC236}">
-                <a16:creationId xmlns:a16="http://schemas.microsoft.com/office/drawing/2014/main" id="{221EEDDD-BC39-D54C-8A20-6D0CBAA89E8A}"/>
-              </a:ext>
-            </a:extLst>
-          </p:cNvPr>
-          <p:cNvPicPr>
-            <a:picLocks noChangeAspect="1"/>
-          </p:cNvPicPr>
-          <p:nvPr/>
-        </p:nvPicPr>
-        <p:blipFill>
-          <a:blip r:embed="rId2">
-            <a:extLst>
-              <a:ext uri="{96DAC541-7B7A-43D3-8B79-37D633B846F1}">
-                <asvg:svgBlip xmlns:asvg="http://schemas.microsoft.com/office/drawing/2016/SVG/main" r:embed="rId3"/>
-              </a:ext>
-            </a:extLst>
-          </a:blip>
-          <a:stretch>
-            <a:fillRect/>
-          </a:stretch>
-        </p:blipFill>
-        <p:spPr>
-          <a:xfrm rot="16200000">
-            <a:off x="4114800" y="2971800"/>
-            <a:ext cx="914400" cy="914400"/>
-          </a:xfrm>
-          <a:prstGeom prst="rect">
-            <a:avLst/>
-          </a:prstGeom>
-        </p:spPr>
-      </p:pic>
+            <a:ln>
+              <a:noFill/>
+            </a:ln>
+          </p:spPr>
+          <p:style>
+            <a:lnRef idx="1">
+              <a:schemeClr val="accent3"/>
+            </a:lnRef>
+            <a:fillRef idx="2">
+              <a:schemeClr val="accent3"/>
+            </a:fillRef>
+            <a:effectRef idx="1">
+              <a:schemeClr val="accent3"/>
+            </a:effectRef>
+            <a:fontRef idx="minor">
+              <a:schemeClr val="dk1"/>
+            </a:fontRef>
+          </p:style>
+          <p:txBody>
+            <a:bodyPr rtlCol="0" anchor="ctr"/>
+            <a:lstStyle/>
+            <a:p>
+              <a:pPr algn="ctr"/>
+              <a:r>
+                <a:rPr lang="zh-CN" altLang="en-US" sz="3600" dirty="0"/>
+                <a:t>搖桿</a:t>
+              </a:r>
+              <a:endParaRPr lang="en-US" altLang="zh-CN" sz="3600" dirty="0"/>
+            </a:p>
+          </p:txBody>
+        </p:sp>
+      </p:grpSp>
     </p:spTree>
     <p:extLst>
       <p:ext uri="{BB962C8B-B14F-4D97-AF65-F5344CB8AC3E}">
@@ -3570,96 +3699,115 @@
           <a:chExt cx="0" cy="0"/>
         </a:xfrm>
       </p:grpSpPr>
-      <p:pic>
-        <p:nvPicPr>
-          <p:cNvPr id="11" name="Graphic 10" descr="Checkmark">
+      <p:grpSp>
+        <p:nvGrpSpPr>
+          <p:cNvPr id="2" name="Group 1">
             <a:extLst>
               <a:ext uri="{FF2B5EF4-FFF2-40B4-BE49-F238E27FC236}">
-                <a16:creationId xmlns:a16="http://schemas.microsoft.com/office/drawing/2014/main" id="{BD6E3427-B5C3-0C40-A4B1-7CEBD1B83431}"/>
+                <a16:creationId xmlns:a16="http://schemas.microsoft.com/office/drawing/2014/main" id="{C38B498D-2593-1A4C-AC11-DEF478C2BA2D}"/>
               </a:ext>
             </a:extLst>
           </p:cNvPr>
-          <p:cNvPicPr>
-            <a:picLocks noChangeAspect="1"/>
-          </p:cNvPicPr>
+          <p:cNvGrpSpPr/>
           <p:nvPr/>
-        </p:nvPicPr>
-        <p:blipFill>
-          <a:blip r:embed="rId2">
-            <a:extLst>
-              <a:ext uri="{96DAC541-7B7A-43D3-8B79-37D633B846F1}">
-                <asvg:svgBlip xmlns:asvg="http://schemas.microsoft.com/office/drawing/2016/SVG/main" r:embed="rId3"/>
-              </a:ext>
-            </a:extLst>
-          </a:blip>
-          <a:stretch>
-            <a:fillRect/>
-          </a:stretch>
-        </p:blipFill>
-        <p:spPr>
+        </p:nvGrpSpPr>
+        <p:grpSpPr>
           <a:xfrm>
-            <a:off x="4114800" y="2971800"/>
-            <a:ext cx="914400" cy="914400"/>
+            <a:off x="3918857" y="2600503"/>
+            <a:ext cx="1306286" cy="1656994"/>
+            <a:chOff x="3918857" y="2229206"/>
+            <a:chExt cx="1306286" cy="1656994"/>
           </a:xfrm>
-          <a:prstGeom prst="rect">
-            <a:avLst/>
-          </a:prstGeom>
-        </p:spPr>
-      </p:pic>
-      <p:sp>
-        <p:nvSpPr>
-          <p:cNvPr id="5" name="Rectangle 4">
-            <a:extLst>
-              <a:ext uri="{FF2B5EF4-FFF2-40B4-BE49-F238E27FC236}">
-                <a16:creationId xmlns:a16="http://schemas.microsoft.com/office/drawing/2014/main" id="{F4841DAB-6795-AC4E-959E-8307ED2F1058}"/>
-              </a:ext>
-            </a:extLst>
-          </p:cNvPr>
-          <p:cNvSpPr/>
-          <p:nvPr/>
-        </p:nvSpPr>
-        <p:spPr>
-          <a:xfrm>
-            <a:off x="4114800" y="2501348"/>
-            <a:ext cx="914400" cy="470452"/>
-          </a:xfrm>
-          <a:prstGeom prst="rect">
-            <a:avLst/>
-          </a:prstGeom>
-          <a:solidFill>
-            <a:schemeClr val="bg1"/>
-          </a:solidFill>
-          <a:ln>
+        </p:grpSpPr>
+        <p:pic>
+          <p:nvPicPr>
+            <p:cNvPr id="11" name="Graphic 10" descr="Checkmark">
+              <a:extLst>
+                <a:ext uri="{FF2B5EF4-FFF2-40B4-BE49-F238E27FC236}">
+                  <a16:creationId xmlns:a16="http://schemas.microsoft.com/office/drawing/2014/main" id="{BD6E3427-B5C3-0C40-A4B1-7CEBD1B83431}"/>
+                </a:ext>
+              </a:extLst>
+            </p:cNvPr>
+            <p:cNvPicPr>
+              <a:picLocks noChangeAspect="1"/>
+            </p:cNvPicPr>
+            <p:nvPr/>
+          </p:nvPicPr>
+          <p:blipFill>
+            <a:blip r:embed="rId3">
+              <a:extLst>
+                <a:ext uri="{96DAC541-7B7A-43D3-8B79-37D633B846F1}">
+                  <asvg:svgBlip xmlns:asvg="http://schemas.microsoft.com/office/drawing/2016/SVG/main" r:embed="rId4"/>
+                </a:ext>
+              </a:extLst>
+            </a:blip>
+            <a:stretch>
+              <a:fillRect/>
+            </a:stretch>
+          </p:blipFill>
+          <p:spPr>
+            <a:xfrm>
+              <a:off x="4114800" y="2971800"/>
+              <a:ext cx="914400" cy="914400"/>
+            </a:xfrm>
+            <a:prstGeom prst="rect">
+              <a:avLst/>
+            </a:prstGeom>
+          </p:spPr>
+        </p:pic>
+        <p:sp>
+          <p:nvSpPr>
+            <p:cNvPr id="4" name="Rectangle 3">
+              <a:extLst>
+                <a:ext uri="{FF2B5EF4-FFF2-40B4-BE49-F238E27FC236}">
+                  <a16:creationId xmlns:a16="http://schemas.microsoft.com/office/drawing/2014/main" id="{31BE6BBF-AA46-E346-8D17-8050CCC11770}"/>
+                </a:ext>
+              </a:extLst>
+            </p:cNvPr>
+            <p:cNvSpPr/>
+            <p:nvPr/>
+          </p:nvSpPr>
+          <p:spPr>
+            <a:xfrm>
+              <a:off x="3918857" y="2229206"/>
+              <a:ext cx="1306286" cy="470452"/>
+            </a:xfrm>
+            <a:prstGeom prst="rect">
+              <a:avLst/>
+            </a:prstGeom>
             <a:noFill/>
-          </a:ln>
-        </p:spPr>
-        <p:style>
-          <a:lnRef idx="1">
-            <a:schemeClr val="accent3"/>
-          </a:lnRef>
-          <a:fillRef idx="2">
-            <a:schemeClr val="accent3"/>
-          </a:fillRef>
-          <a:effectRef idx="1">
-            <a:schemeClr val="accent3"/>
-          </a:effectRef>
-          <a:fontRef idx="minor">
-            <a:schemeClr val="dk1"/>
-          </a:fontRef>
-        </p:style>
-        <p:txBody>
-          <a:bodyPr rtlCol="0" anchor="ctr"/>
-          <a:lstStyle/>
-          <a:p>
-            <a:pPr algn="ctr"/>
-            <a:r>
-              <a:rPr lang="zh-CN" altLang="en-US" dirty="0"/>
-              <a:t>搖桿</a:t>
-            </a:r>
-            <a:endParaRPr lang="en-US" altLang="zh-CN" dirty="0"/>
-          </a:p>
-        </p:txBody>
-      </p:sp>
+            <a:ln>
+              <a:noFill/>
+            </a:ln>
+          </p:spPr>
+          <p:style>
+            <a:lnRef idx="1">
+              <a:schemeClr val="accent3"/>
+            </a:lnRef>
+            <a:fillRef idx="2">
+              <a:schemeClr val="accent3"/>
+            </a:fillRef>
+            <a:effectRef idx="1">
+              <a:schemeClr val="accent3"/>
+            </a:effectRef>
+            <a:fontRef idx="minor">
+              <a:schemeClr val="dk1"/>
+            </a:fontRef>
+          </p:style>
+          <p:txBody>
+            <a:bodyPr rtlCol="0" anchor="ctr"/>
+            <a:lstStyle/>
+            <a:p>
+              <a:pPr algn="ctr"/>
+              <a:r>
+                <a:rPr lang="zh-CN" altLang="en-US" sz="3600" dirty="0"/>
+                <a:t>搖桿</a:t>
+              </a:r>
+              <a:endParaRPr lang="en-US" altLang="zh-CN" sz="3600" dirty="0"/>
+            </a:p>
+          </p:txBody>
+        </p:sp>
+      </p:grpSp>
     </p:spTree>
     <p:extLst>
       <p:ext uri="{BB962C8B-B14F-4D97-AF65-F5344CB8AC3E}">
@@ -3690,48 +3838,151 @@
           <a:chExt cx="0" cy="0"/>
         </a:xfrm>
       </p:grpSpPr>
-      <p:pic>
-        <p:nvPicPr>
-          <p:cNvPr id="13" name="Graphic 12" descr="Close">
+      <p:grpSp>
+        <p:nvGrpSpPr>
+          <p:cNvPr id="2" name="Group 1">
             <a:extLst>
               <a:ext uri="{FF2B5EF4-FFF2-40B4-BE49-F238E27FC236}">
-                <a16:creationId xmlns:a16="http://schemas.microsoft.com/office/drawing/2014/main" id="{0555376C-49CB-1C4B-A4E7-F6E2C2852BA0}"/>
+                <a16:creationId xmlns:a16="http://schemas.microsoft.com/office/drawing/2014/main" id="{AAB69A45-C4DD-0D40-9C9B-E12519F21C8B}"/>
               </a:ext>
             </a:extLst>
           </p:cNvPr>
-          <p:cNvPicPr>
-            <a:picLocks noChangeAspect="1"/>
-          </p:cNvPicPr>
+          <p:cNvGrpSpPr/>
           <p:nvPr/>
-        </p:nvPicPr>
-        <p:blipFill>
-          <a:blip r:embed="rId2">
-            <a:extLst>
-              <a:ext uri="{96DAC541-7B7A-43D3-8B79-37D633B846F1}">
-                <asvg:svgBlip xmlns:asvg="http://schemas.microsoft.com/office/drawing/2016/SVG/main" r:embed="rId3"/>
-              </a:ext>
-            </a:extLst>
-          </a:blip>
-          <a:stretch>
-            <a:fillRect/>
-          </a:stretch>
-        </p:blipFill>
-        <p:spPr>
+        </p:nvGrpSpPr>
+        <p:grpSpPr>
           <a:xfrm>
-            <a:off x="4114800" y="2971800"/>
-            <a:ext cx="914400" cy="914400"/>
+            <a:off x="3918857" y="2600503"/>
+            <a:ext cx="1306286" cy="1656994"/>
+            <a:chOff x="3918857" y="2229206"/>
+            <a:chExt cx="1306286" cy="1656994"/>
           </a:xfrm>
-          <a:prstGeom prst="rect">
-            <a:avLst/>
-          </a:prstGeom>
-        </p:spPr>
-      </p:pic>
+        </p:grpSpPr>
+        <p:pic>
+          <p:nvPicPr>
+            <p:cNvPr id="13" name="Graphic 12" descr="Close">
+              <a:extLst>
+                <a:ext uri="{FF2B5EF4-FFF2-40B4-BE49-F238E27FC236}">
+                  <a16:creationId xmlns:a16="http://schemas.microsoft.com/office/drawing/2014/main" id="{0555376C-49CB-1C4B-A4E7-F6E2C2852BA0}"/>
+                </a:ext>
+              </a:extLst>
+            </p:cNvPr>
+            <p:cNvPicPr>
+              <a:picLocks noChangeAspect="1"/>
+            </p:cNvPicPr>
+            <p:nvPr/>
+          </p:nvPicPr>
+          <p:blipFill>
+            <a:blip r:embed="rId2">
+              <a:extLst>
+                <a:ext uri="{96DAC541-7B7A-43D3-8B79-37D633B846F1}">
+                  <asvg:svgBlip xmlns:asvg="http://schemas.microsoft.com/office/drawing/2016/SVG/main" r:embed="rId3"/>
+                </a:ext>
+              </a:extLst>
+            </a:blip>
+            <a:stretch>
+              <a:fillRect/>
+            </a:stretch>
+          </p:blipFill>
+          <p:spPr>
+            <a:xfrm>
+              <a:off x="4114800" y="2971800"/>
+              <a:ext cx="914400" cy="914400"/>
+            </a:xfrm>
+            <a:prstGeom prst="rect">
+              <a:avLst/>
+            </a:prstGeom>
+          </p:spPr>
+        </p:pic>
+        <p:sp>
+          <p:nvSpPr>
+            <p:cNvPr id="5" name="Rectangle 4">
+              <a:extLst>
+                <a:ext uri="{FF2B5EF4-FFF2-40B4-BE49-F238E27FC236}">
+                  <a16:creationId xmlns:a16="http://schemas.microsoft.com/office/drawing/2014/main" id="{F4841DAB-6795-AC4E-959E-8307ED2F1058}"/>
+                </a:ext>
+              </a:extLst>
+            </p:cNvPr>
+            <p:cNvSpPr/>
+            <p:nvPr/>
+          </p:nvSpPr>
+          <p:spPr>
+            <a:xfrm>
+              <a:off x="3918857" y="2229206"/>
+              <a:ext cx="1306286" cy="470452"/>
+            </a:xfrm>
+            <a:prstGeom prst="rect">
+              <a:avLst/>
+            </a:prstGeom>
+            <a:noFill/>
+            <a:ln>
+              <a:noFill/>
+            </a:ln>
+          </p:spPr>
+          <p:style>
+            <a:lnRef idx="1">
+              <a:schemeClr val="accent3"/>
+            </a:lnRef>
+            <a:fillRef idx="2">
+              <a:schemeClr val="accent3"/>
+            </a:fillRef>
+            <a:effectRef idx="1">
+              <a:schemeClr val="accent3"/>
+            </a:effectRef>
+            <a:fontRef idx="minor">
+              <a:schemeClr val="dk1"/>
+            </a:fontRef>
+          </p:style>
+          <p:txBody>
+            <a:bodyPr rtlCol="0" anchor="ctr"/>
+            <a:lstStyle/>
+            <a:p>
+              <a:pPr algn="ctr"/>
+              <a:r>
+                <a:rPr lang="zh-CN" altLang="en-US" sz="3600" dirty="0"/>
+                <a:t>搖桿</a:t>
+              </a:r>
+              <a:endParaRPr lang="en-US" altLang="zh-CN" sz="3600" dirty="0"/>
+            </a:p>
+          </p:txBody>
+        </p:sp>
+      </p:grpSp>
+    </p:spTree>
+    <p:extLst>
+      <p:ext uri="{BB962C8B-B14F-4D97-AF65-F5344CB8AC3E}">
+        <p14:creationId xmlns:p14="http://schemas.microsoft.com/office/powerpoint/2010/main" val="1061911595"/>
+      </p:ext>
+    </p:extLst>
+  </p:cSld>
+  <p:clrMapOvr>
+    <a:masterClrMapping/>
+  </p:clrMapOvr>
+</p:sld>
+</file>
+
+<file path=ppt/slides/slide13.xml><?xml version="1.0" encoding="utf-8"?>
+<p:sld xmlns:a="http://schemas.openxmlformats.org/drawingml/2006/main" xmlns:r="http://schemas.openxmlformats.org/officeDocument/2006/relationships" xmlns:p="http://schemas.openxmlformats.org/presentationml/2006/main">
+  <p:cSld>
+    <p:spTree>
+      <p:nvGrpSpPr>
+        <p:cNvPr id="1" name=""/>
+        <p:cNvGrpSpPr/>
+        <p:nvPr/>
+      </p:nvGrpSpPr>
+      <p:grpSpPr>
+        <a:xfrm>
+          <a:off x="0" y="0"/>
+          <a:ext cx="0" cy="0"/>
+          <a:chOff x="0" y="0"/>
+          <a:chExt cx="0" cy="0"/>
+        </a:xfrm>
+      </p:grpSpPr>
       <p:sp>
         <p:nvSpPr>
           <p:cNvPr id="5" name="Rectangle 4">
             <a:extLst>
               <a:ext uri="{FF2B5EF4-FFF2-40B4-BE49-F238E27FC236}">
-                <a16:creationId xmlns:a16="http://schemas.microsoft.com/office/drawing/2014/main" id="{F4841DAB-6795-AC4E-959E-8307ED2F1058}"/>
+                <a16:creationId xmlns:a16="http://schemas.microsoft.com/office/drawing/2014/main" id="{EE2EB717-B67C-504D-AE5F-13E7BAD2FD25}"/>
               </a:ext>
             </a:extLst>
           </p:cNvPr>
@@ -3740,15 +3991,13 @@
         </p:nvSpPr>
         <p:spPr>
           <a:xfrm>
-            <a:off x="4114800" y="2501348"/>
-            <a:ext cx="914400" cy="470452"/>
+            <a:off x="3826328" y="3026229"/>
+            <a:ext cx="1491343" cy="805542"/>
           </a:xfrm>
           <a:prstGeom prst="rect">
             <a:avLst/>
           </a:prstGeom>
-          <a:solidFill>
-            <a:schemeClr val="bg1"/>
-          </a:solidFill>
+          <a:noFill/>
           <a:ln>
             <a:noFill/>
           </a:ln>
@@ -3773,17 +4022,119 @@
           <a:p>
             <a:pPr algn="ctr"/>
             <a:r>
-              <a:rPr lang="zh-CN" altLang="en-US" dirty="0"/>
-              <a:t>搖桿</a:t>
-            </a:r>
-            <a:endParaRPr lang="en-US" altLang="zh-CN" dirty="0"/>
+              <a:rPr lang="zh-CN" altLang="en-US" sz="3600" b="1" dirty="0">
+                <a:solidFill>
+                  <a:schemeClr val="accent5">
+                    <a:lumMod val="75000"/>
+                  </a:schemeClr>
+                </a:solidFill>
+              </a:rPr>
+              <a:t>休息</a:t>
+            </a:r>
+            <a:endParaRPr lang="en-US" altLang="zh-CN" sz="3600" b="1" dirty="0">
+              <a:solidFill>
+                <a:schemeClr val="accent5">
+                  <a:lumMod val="75000"/>
+                </a:schemeClr>
+              </a:solidFill>
+            </a:endParaRPr>
           </a:p>
         </p:txBody>
       </p:sp>
     </p:spTree>
     <p:extLst>
       <p:ext uri="{BB962C8B-B14F-4D97-AF65-F5344CB8AC3E}">
-        <p14:creationId xmlns:p14="http://schemas.microsoft.com/office/powerpoint/2010/main" val="1061911595"/>
+        <p14:creationId xmlns:p14="http://schemas.microsoft.com/office/powerpoint/2010/main" val="2888048580"/>
+      </p:ext>
+    </p:extLst>
+  </p:cSld>
+  <p:clrMapOvr>
+    <a:masterClrMapping/>
+  </p:clrMapOvr>
+</p:sld>
+</file>
+
+<file path=ppt/slides/slide14.xml><?xml version="1.0" encoding="utf-8"?>
+<p:sld xmlns:a="http://schemas.openxmlformats.org/drawingml/2006/main" xmlns:r="http://schemas.openxmlformats.org/officeDocument/2006/relationships" xmlns:p="http://schemas.openxmlformats.org/presentationml/2006/main">
+  <p:cSld>
+    <p:spTree>
+      <p:nvGrpSpPr>
+        <p:cNvPr id="1" name=""/>
+        <p:cNvGrpSpPr/>
+        <p:nvPr/>
+      </p:nvGrpSpPr>
+      <p:grpSpPr>
+        <a:xfrm>
+          <a:off x="0" y="0"/>
+          <a:ext cx="0" cy="0"/>
+          <a:chOff x="0" y="0"/>
+          <a:chExt cx="0" cy="0"/>
+        </a:xfrm>
+      </p:grpSpPr>
+      <p:sp>
+        <p:nvSpPr>
+          <p:cNvPr id="5" name="Rectangle 4">
+            <a:extLst>
+              <a:ext uri="{FF2B5EF4-FFF2-40B4-BE49-F238E27FC236}">
+                <a16:creationId xmlns:a16="http://schemas.microsoft.com/office/drawing/2014/main" id="{EE2EB717-B67C-504D-AE5F-13E7BAD2FD25}"/>
+              </a:ext>
+            </a:extLst>
+          </p:cNvPr>
+          <p:cNvSpPr/>
+          <p:nvPr/>
+        </p:nvSpPr>
+        <p:spPr>
+          <a:xfrm>
+            <a:off x="3404507" y="3026229"/>
+            <a:ext cx="2334985" cy="805542"/>
+          </a:xfrm>
+          <a:prstGeom prst="rect">
+            <a:avLst/>
+          </a:prstGeom>
+          <a:noFill/>
+          <a:ln>
+            <a:noFill/>
+          </a:ln>
+        </p:spPr>
+        <p:style>
+          <a:lnRef idx="1">
+            <a:schemeClr val="accent3"/>
+          </a:lnRef>
+          <a:fillRef idx="2">
+            <a:schemeClr val="accent3"/>
+          </a:fillRef>
+          <a:effectRef idx="1">
+            <a:schemeClr val="accent3"/>
+          </a:effectRef>
+          <a:fontRef idx="minor">
+            <a:schemeClr val="dk1"/>
+          </a:fontRef>
+        </p:style>
+        <p:txBody>
+          <a:bodyPr rtlCol="0" anchor="ctr"/>
+          <a:lstStyle/>
+          <a:p>
+            <a:pPr algn="ctr"/>
+            <a:r>
+              <a:rPr lang="zh-CN" altLang="en-US" sz="3600" b="1" dirty="0">
+                <a:solidFill>
+                  <a:schemeClr val="accent2"/>
+                </a:solidFill>
+              </a:rPr>
+              <a:t>實驗開始</a:t>
+            </a:r>
+            <a:endParaRPr lang="en-US" altLang="zh-CN" sz="3600" b="1" dirty="0">
+              <a:solidFill>
+                <a:schemeClr val="accent2"/>
+              </a:solidFill>
+            </a:endParaRPr>
+          </a:p>
+        </p:txBody>
+      </p:sp>
+    </p:spTree>
+    <p:extLst>
+      <p:ext uri="{BB962C8B-B14F-4D97-AF65-F5344CB8AC3E}">
+        <p14:creationId xmlns:p14="http://schemas.microsoft.com/office/powerpoint/2010/main" val="210350523"/>
       </p:ext>
     </p:extLst>
   </p:cSld>
@@ -3810,96 +4161,115 @@
           <a:chExt cx="0" cy="0"/>
         </a:xfrm>
       </p:grpSpPr>
-      <p:sp>
-        <p:nvSpPr>
-          <p:cNvPr id="5" name="Rectangle 4">
+      <p:grpSp>
+        <p:nvGrpSpPr>
+          <p:cNvPr id="2" name="Group 1">
             <a:extLst>
               <a:ext uri="{FF2B5EF4-FFF2-40B4-BE49-F238E27FC236}">
-                <a16:creationId xmlns:a16="http://schemas.microsoft.com/office/drawing/2014/main" id="{F4841DAB-6795-AC4E-959E-8307ED2F1058}"/>
+                <a16:creationId xmlns:a16="http://schemas.microsoft.com/office/drawing/2014/main" id="{0C4763B8-413C-E945-9FE1-77DF73FA6402}"/>
               </a:ext>
             </a:extLst>
           </p:cNvPr>
-          <p:cNvSpPr/>
+          <p:cNvGrpSpPr/>
           <p:nvPr/>
-        </p:nvSpPr>
-        <p:spPr>
+        </p:nvGrpSpPr>
+        <p:grpSpPr>
           <a:xfrm>
-            <a:off x="4114800" y="2501348"/>
-            <a:ext cx="914400" cy="470452"/>
+            <a:off x="3918857" y="2600503"/>
+            <a:ext cx="1306286" cy="1656994"/>
+            <a:chOff x="3918857" y="2229206"/>
+            <a:chExt cx="1306286" cy="1656994"/>
           </a:xfrm>
-          <a:prstGeom prst="rect">
-            <a:avLst/>
-          </a:prstGeom>
-          <a:solidFill>
-            <a:schemeClr val="bg1"/>
-          </a:solidFill>
-          <a:ln>
+        </p:grpSpPr>
+        <p:pic>
+          <p:nvPicPr>
+            <p:cNvPr id="7" name="Graphic 6" descr="Line arrow Straight">
+              <a:extLst>
+                <a:ext uri="{FF2B5EF4-FFF2-40B4-BE49-F238E27FC236}">
+                  <a16:creationId xmlns:a16="http://schemas.microsoft.com/office/drawing/2014/main" id="{221EEDDD-BC39-D54C-8A20-6D0CBAA89E8A}"/>
+                </a:ext>
+              </a:extLst>
+            </p:cNvPr>
+            <p:cNvPicPr>
+              <a:picLocks noChangeAspect="1"/>
+            </p:cNvPicPr>
+            <p:nvPr/>
+          </p:nvPicPr>
+          <p:blipFill>
+            <a:blip r:embed="rId2">
+              <a:extLst>
+                <a:ext uri="{96DAC541-7B7A-43D3-8B79-37D633B846F1}">
+                  <asvg:svgBlip xmlns:asvg="http://schemas.microsoft.com/office/drawing/2016/SVG/main" r:embed="rId3"/>
+                </a:ext>
+              </a:extLst>
+            </a:blip>
+            <a:stretch>
+              <a:fillRect/>
+            </a:stretch>
+          </p:blipFill>
+          <p:spPr>
+            <a:xfrm rot="10800000">
+              <a:off x="4114800" y="2971800"/>
+              <a:ext cx="914400" cy="914400"/>
+            </a:xfrm>
+            <a:prstGeom prst="rect">
+              <a:avLst/>
+            </a:prstGeom>
+          </p:spPr>
+        </p:pic>
+        <p:sp>
+          <p:nvSpPr>
+            <p:cNvPr id="4" name="Rectangle 3">
+              <a:extLst>
+                <a:ext uri="{FF2B5EF4-FFF2-40B4-BE49-F238E27FC236}">
+                  <a16:creationId xmlns:a16="http://schemas.microsoft.com/office/drawing/2014/main" id="{BEBDA94B-D66E-CF4F-869D-A3DA4D99CA3F}"/>
+                </a:ext>
+              </a:extLst>
+            </p:cNvPr>
+            <p:cNvSpPr/>
+            <p:nvPr/>
+          </p:nvSpPr>
+          <p:spPr>
+            <a:xfrm>
+              <a:off x="3918857" y="2229206"/>
+              <a:ext cx="1306286" cy="470452"/>
+            </a:xfrm>
+            <a:prstGeom prst="rect">
+              <a:avLst/>
+            </a:prstGeom>
             <a:noFill/>
-          </a:ln>
-        </p:spPr>
-        <p:style>
-          <a:lnRef idx="1">
-            <a:schemeClr val="accent3"/>
-          </a:lnRef>
-          <a:fillRef idx="2">
-            <a:schemeClr val="accent3"/>
-          </a:fillRef>
-          <a:effectRef idx="1">
-            <a:schemeClr val="accent3"/>
-          </a:effectRef>
-          <a:fontRef idx="minor">
-            <a:schemeClr val="dk1"/>
-          </a:fontRef>
-        </p:style>
-        <p:txBody>
-          <a:bodyPr rtlCol="0" anchor="ctr"/>
-          <a:lstStyle/>
-          <a:p>
-            <a:pPr algn="ctr"/>
-            <a:r>
-              <a:rPr lang="zh-CN" altLang="en-US" dirty="0"/>
-              <a:t>滾輪</a:t>
-            </a:r>
-            <a:endParaRPr lang="en-US" altLang="zh-CN" dirty="0"/>
-          </a:p>
-        </p:txBody>
-      </p:sp>
-      <p:pic>
-        <p:nvPicPr>
-          <p:cNvPr id="7" name="Graphic 6" descr="Line arrow Straight">
-            <a:extLst>
-              <a:ext uri="{FF2B5EF4-FFF2-40B4-BE49-F238E27FC236}">
-                <a16:creationId xmlns:a16="http://schemas.microsoft.com/office/drawing/2014/main" id="{221EEDDD-BC39-D54C-8A20-6D0CBAA89E8A}"/>
-              </a:ext>
-            </a:extLst>
-          </p:cNvPr>
-          <p:cNvPicPr>
-            <a:picLocks noChangeAspect="1"/>
-          </p:cNvPicPr>
-          <p:nvPr/>
-        </p:nvPicPr>
-        <p:blipFill>
-          <a:blip r:embed="rId2">
-            <a:extLst>
-              <a:ext uri="{96DAC541-7B7A-43D3-8B79-37D633B846F1}">
-                <asvg:svgBlip xmlns:asvg="http://schemas.microsoft.com/office/drawing/2016/SVG/main" r:embed="rId3"/>
-              </a:ext>
-            </a:extLst>
-          </a:blip>
-          <a:stretch>
-            <a:fillRect/>
-          </a:stretch>
-        </p:blipFill>
-        <p:spPr>
-          <a:xfrm rot="10800000">
-            <a:off x="4114800" y="2971800"/>
-            <a:ext cx="914400" cy="914400"/>
-          </a:xfrm>
-          <a:prstGeom prst="rect">
-            <a:avLst/>
-          </a:prstGeom>
-        </p:spPr>
-      </p:pic>
+            <a:ln>
+              <a:noFill/>
+            </a:ln>
+          </p:spPr>
+          <p:style>
+            <a:lnRef idx="1">
+              <a:schemeClr val="accent3"/>
+            </a:lnRef>
+            <a:fillRef idx="2">
+              <a:schemeClr val="accent3"/>
+            </a:fillRef>
+            <a:effectRef idx="1">
+              <a:schemeClr val="accent3"/>
+            </a:effectRef>
+            <a:fontRef idx="minor">
+              <a:schemeClr val="dk1"/>
+            </a:fontRef>
+          </p:style>
+          <p:txBody>
+            <a:bodyPr rtlCol="0" anchor="ctr"/>
+            <a:lstStyle/>
+            <a:p>
+              <a:pPr algn="ctr"/>
+              <a:r>
+                <a:rPr lang="zh-CN" altLang="en-US" sz="3600" dirty="0"/>
+                <a:t>滾輪</a:t>
+              </a:r>
+              <a:endParaRPr lang="en-US" altLang="zh-CN" sz="3600" dirty="0"/>
+            </a:p>
+          </p:txBody>
+        </p:sp>
+      </p:grpSp>
     </p:spTree>
     <p:extLst>
       <p:ext uri="{BB962C8B-B14F-4D97-AF65-F5344CB8AC3E}">
@@ -3930,96 +4300,115 @@
           <a:chExt cx="0" cy="0"/>
         </a:xfrm>
       </p:grpSpPr>
-      <p:sp>
-        <p:nvSpPr>
-          <p:cNvPr id="5" name="Rectangle 4">
+      <p:grpSp>
+        <p:nvGrpSpPr>
+          <p:cNvPr id="2" name="Group 1">
             <a:extLst>
               <a:ext uri="{FF2B5EF4-FFF2-40B4-BE49-F238E27FC236}">
-                <a16:creationId xmlns:a16="http://schemas.microsoft.com/office/drawing/2014/main" id="{F4841DAB-6795-AC4E-959E-8307ED2F1058}"/>
+                <a16:creationId xmlns:a16="http://schemas.microsoft.com/office/drawing/2014/main" id="{B0ECB0A8-9CC6-9E4F-8DD1-EF7829184D09}"/>
               </a:ext>
             </a:extLst>
           </p:cNvPr>
-          <p:cNvSpPr/>
+          <p:cNvGrpSpPr/>
           <p:nvPr/>
-        </p:nvSpPr>
-        <p:spPr>
+        </p:nvGrpSpPr>
+        <p:grpSpPr>
           <a:xfrm>
-            <a:off x="4114800" y="2501348"/>
-            <a:ext cx="914400" cy="470452"/>
+            <a:off x="3918857" y="2600503"/>
+            <a:ext cx="1306286" cy="1656994"/>
+            <a:chOff x="3918857" y="2229206"/>
+            <a:chExt cx="1306286" cy="1656994"/>
           </a:xfrm>
-          <a:prstGeom prst="rect">
-            <a:avLst/>
-          </a:prstGeom>
-          <a:solidFill>
-            <a:schemeClr val="bg1"/>
-          </a:solidFill>
-          <a:ln>
+        </p:grpSpPr>
+        <p:pic>
+          <p:nvPicPr>
+            <p:cNvPr id="7" name="Graphic 6" descr="Line arrow Straight">
+              <a:extLst>
+                <a:ext uri="{FF2B5EF4-FFF2-40B4-BE49-F238E27FC236}">
+                  <a16:creationId xmlns:a16="http://schemas.microsoft.com/office/drawing/2014/main" id="{221EEDDD-BC39-D54C-8A20-6D0CBAA89E8A}"/>
+                </a:ext>
+              </a:extLst>
+            </p:cNvPr>
+            <p:cNvPicPr>
+              <a:picLocks noChangeAspect="1"/>
+            </p:cNvPicPr>
+            <p:nvPr/>
+          </p:nvPicPr>
+          <p:blipFill>
+            <a:blip r:embed="rId2">
+              <a:extLst>
+                <a:ext uri="{96DAC541-7B7A-43D3-8B79-37D633B846F1}">
+                  <asvg:svgBlip xmlns:asvg="http://schemas.microsoft.com/office/drawing/2016/SVG/main" r:embed="rId3"/>
+                </a:ext>
+              </a:extLst>
+            </a:blip>
+            <a:stretch>
+              <a:fillRect/>
+            </a:stretch>
+          </p:blipFill>
+          <p:spPr>
+            <a:xfrm rot="5400000">
+              <a:off x="4114800" y="2971800"/>
+              <a:ext cx="914400" cy="914400"/>
+            </a:xfrm>
+            <a:prstGeom prst="rect">
+              <a:avLst/>
+            </a:prstGeom>
+          </p:spPr>
+        </p:pic>
+        <p:sp>
+          <p:nvSpPr>
+            <p:cNvPr id="4" name="Rectangle 3">
+              <a:extLst>
+                <a:ext uri="{FF2B5EF4-FFF2-40B4-BE49-F238E27FC236}">
+                  <a16:creationId xmlns:a16="http://schemas.microsoft.com/office/drawing/2014/main" id="{C59E60D4-5475-2143-98A6-005BC85F3817}"/>
+                </a:ext>
+              </a:extLst>
+            </p:cNvPr>
+            <p:cNvSpPr/>
+            <p:nvPr/>
+          </p:nvSpPr>
+          <p:spPr>
+            <a:xfrm>
+              <a:off x="3918857" y="2229206"/>
+              <a:ext cx="1306286" cy="470452"/>
+            </a:xfrm>
+            <a:prstGeom prst="rect">
+              <a:avLst/>
+            </a:prstGeom>
             <a:noFill/>
-          </a:ln>
-        </p:spPr>
-        <p:style>
-          <a:lnRef idx="1">
-            <a:schemeClr val="accent3"/>
-          </a:lnRef>
-          <a:fillRef idx="2">
-            <a:schemeClr val="accent3"/>
-          </a:fillRef>
-          <a:effectRef idx="1">
-            <a:schemeClr val="accent3"/>
-          </a:effectRef>
-          <a:fontRef idx="minor">
-            <a:schemeClr val="dk1"/>
-          </a:fontRef>
-        </p:style>
-        <p:txBody>
-          <a:bodyPr rtlCol="0" anchor="ctr"/>
-          <a:lstStyle/>
-          <a:p>
-            <a:pPr algn="ctr"/>
-            <a:r>
-              <a:rPr lang="zh-CN" altLang="en-US" dirty="0"/>
-              <a:t>滾輪</a:t>
-            </a:r>
-            <a:endParaRPr lang="en-US" altLang="zh-CN" dirty="0"/>
-          </a:p>
-        </p:txBody>
-      </p:sp>
-      <p:pic>
-        <p:nvPicPr>
-          <p:cNvPr id="7" name="Graphic 6" descr="Line arrow Straight">
-            <a:extLst>
-              <a:ext uri="{FF2B5EF4-FFF2-40B4-BE49-F238E27FC236}">
-                <a16:creationId xmlns:a16="http://schemas.microsoft.com/office/drawing/2014/main" id="{221EEDDD-BC39-D54C-8A20-6D0CBAA89E8A}"/>
-              </a:ext>
-            </a:extLst>
-          </p:cNvPr>
-          <p:cNvPicPr>
-            <a:picLocks noChangeAspect="1"/>
-          </p:cNvPicPr>
-          <p:nvPr/>
-        </p:nvPicPr>
-        <p:blipFill>
-          <a:blip r:embed="rId2">
-            <a:extLst>
-              <a:ext uri="{96DAC541-7B7A-43D3-8B79-37D633B846F1}">
-                <asvg:svgBlip xmlns:asvg="http://schemas.microsoft.com/office/drawing/2016/SVG/main" r:embed="rId3"/>
-              </a:ext>
-            </a:extLst>
-          </a:blip>
-          <a:stretch>
-            <a:fillRect/>
-          </a:stretch>
-        </p:blipFill>
-        <p:spPr>
-          <a:xfrm rot="5400000">
-            <a:off x="4114800" y="2971800"/>
-            <a:ext cx="914400" cy="914400"/>
-          </a:xfrm>
-          <a:prstGeom prst="rect">
-            <a:avLst/>
-          </a:prstGeom>
-        </p:spPr>
-      </p:pic>
+            <a:ln>
+              <a:noFill/>
+            </a:ln>
+          </p:spPr>
+          <p:style>
+            <a:lnRef idx="1">
+              <a:schemeClr val="accent3"/>
+            </a:lnRef>
+            <a:fillRef idx="2">
+              <a:schemeClr val="accent3"/>
+            </a:fillRef>
+            <a:effectRef idx="1">
+              <a:schemeClr val="accent3"/>
+            </a:effectRef>
+            <a:fontRef idx="minor">
+              <a:schemeClr val="dk1"/>
+            </a:fontRef>
+          </p:style>
+          <p:txBody>
+            <a:bodyPr rtlCol="0" anchor="ctr"/>
+            <a:lstStyle/>
+            <a:p>
+              <a:pPr algn="ctr"/>
+              <a:r>
+                <a:rPr lang="zh-CN" altLang="en-US" sz="3600" dirty="0"/>
+                <a:t>滾輪</a:t>
+              </a:r>
+              <a:endParaRPr lang="en-US" altLang="zh-CN" sz="3600" dirty="0"/>
+            </a:p>
+          </p:txBody>
+        </p:sp>
+      </p:grpSp>
     </p:spTree>
     <p:extLst>
       <p:ext uri="{BB962C8B-B14F-4D97-AF65-F5344CB8AC3E}">
@@ -4050,96 +4439,115 @@
           <a:chExt cx="0" cy="0"/>
         </a:xfrm>
       </p:grpSpPr>
-      <p:sp>
-        <p:nvSpPr>
-          <p:cNvPr id="5" name="Rectangle 4">
+      <p:grpSp>
+        <p:nvGrpSpPr>
+          <p:cNvPr id="2" name="Group 1">
             <a:extLst>
               <a:ext uri="{FF2B5EF4-FFF2-40B4-BE49-F238E27FC236}">
-                <a16:creationId xmlns:a16="http://schemas.microsoft.com/office/drawing/2014/main" id="{F4841DAB-6795-AC4E-959E-8307ED2F1058}"/>
+                <a16:creationId xmlns:a16="http://schemas.microsoft.com/office/drawing/2014/main" id="{3B8F440F-40F5-A849-9B88-DF427A417523}"/>
               </a:ext>
             </a:extLst>
           </p:cNvPr>
-          <p:cNvSpPr/>
+          <p:cNvGrpSpPr/>
           <p:nvPr/>
-        </p:nvSpPr>
-        <p:spPr>
+        </p:nvGrpSpPr>
+        <p:grpSpPr>
           <a:xfrm>
-            <a:off x="4114800" y="2501348"/>
-            <a:ext cx="914400" cy="470452"/>
+            <a:off x="3918857" y="2600503"/>
+            <a:ext cx="1306286" cy="1656994"/>
+            <a:chOff x="3918857" y="2229206"/>
+            <a:chExt cx="1306286" cy="1656994"/>
           </a:xfrm>
-          <a:prstGeom prst="rect">
-            <a:avLst/>
-          </a:prstGeom>
-          <a:solidFill>
-            <a:schemeClr val="bg1"/>
-          </a:solidFill>
-          <a:ln>
+        </p:grpSpPr>
+        <p:pic>
+          <p:nvPicPr>
+            <p:cNvPr id="7" name="Graphic 6" descr="Line arrow Straight">
+              <a:extLst>
+                <a:ext uri="{FF2B5EF4-FFF2-40B4-BE49-F238E27FC236}">
+                  <a16:creationId xmlns:a16="http://schemas.microsoft.com/office/drawing/2014/main" id="{221EEDDD-BC39-D54C-8A20-6D0CBAA89E8A}"/>
+                </a:ext>
+              </a:extLst>
+            </p:cNvPr>
+            <p:cNvPicPr>
+              <a:picLocks noChangeAspect="1"/>
+            </p:cNvPicPr>
+            <p:nvPr/>
+          </p:nvPicPr>
+          <p:blipFill>
+            <a:blip r:embed="rId2">
+              <a:extLst>
+                <a:ext uri="{96DAC541-7B7A-43D3-8B79-37D633B846F1}">
+                  <asvg:svgBlip xmlns:asvg="http://schemas.microsoft.com/office/drawing/2016/SVG/main" r:embed="rId3"/>
+                </a:ext>
+              </a:extLst>
+            </a:blip>
+            <a:stretch>
+              <a:fillRect/>
+            </a:stretch>
+          </p:blipFill>
+          <p:spPr>
+            <a:xfrm rot="16200000">
+              <a:off x="4114800" y="2971800"/>
+              <a:ext cx="914400" cy="914400"/>
+            </a:xfrm>
+            <a:prstGeom prst="rect">
+              <a:avLst/>
+            </a:prstGeom>
+          </p:spPr>
+        </p:pic>
+        <p:sp>
+          <p:nvSpPr>
+            <p:cNvPr id="4" name="Rectangle 3">
+              <a:extLst>
+                <a:ext uri="{FF2B5EF4-FFF2-40B4-BE49-F238E27FC236}">
+                  <a16:creationId xmlns:a16="http://schemas.microsoft.com/office/drawing/2014/main" id="{D19BC8BC-3D5D-B144-9C13-8F176E3C9C36}"/>
+                </a:ext>
+              </a:extLst>
+            </p:cNvPr>
+            <p:cNvSpPr/>
+            <p:nvPr/>
+          </p:nvSpPr>
+          <p:spPr>
+            <a:xfrm>
+              <a:off x="3918857" y="2229206"/>
+              <a:ext cx="1306286" cy="470452"/>
+            </a:xfrm>
+            <a:prstGeom prst="rect">
+              <a:avLst/>
+            </a:prstGeom>
             <a:noFill/>
-          </a:ln>
-        </p:spPr>
-        <p:style>
-          <a:lnRef idx="1">
-            <a:schemeClr val="accent3"/>
-          </a:lnRef>
-          <a:fillRef idx="2">
-            <a:schemeClr val="accent3"/>
-          </a:fillRef>
-          <a:effectRef idx="1">
-            <a:schemeClr val="accent3"/>
-          </a:effectRef>
-          <a:fontRef idx="minor">
-            <a:schemeClr val="dk1"/>
-          </a:fontRef>
-        </p:style>
-        <p:txBody>
-          <a:bodyPr rtlCol="0" anchor="ctr"/>
-          <a:lstStyle/>
-          <a:p>
-            <a:pPr algn="ctr"/>
-            <a:r>
-              <a:rPr lang="zh-CN" altLang="en-US" dirty="0"/>
-              <a:t>滾輪</a:t>
-            </a:r>
-            <a:endParaRPr lang="en-US" altLang="zh-CN" dirty="0"/>
-          </a:p>
-        </p:txBody>
-      </p:sp>
-      <p:pic>
-        <p:nvPicPr>
-          <p:cNvPr id="7" name="Graphic 6" descr="Line arrow Straight">
-            <a:extLst>
-              <a:ext uri="{FF2B5EF4-FFF2-40B4-BE49-F238E27FC236}">
-                <a16:creationId xmlns:a16="http://schemas.microsoft.com/office/drawing/2014/main" id="{221EEDDD-BC39-D54C-8A20-6D0CBAA89E8A}"/>
-              </a:ext>
-            </a:extLst>
-          </p:cNvPr>
-          <p:cNvPicPr>
-            <a:picLocks noChangeAspect="1"/>
-          </p:cNvPicPr>
-          <p:nvPr/>
-        </p:nvPicPr>
-        <p:blipFill>
-          <a:blip r:embed="rId2">
-            <a:extLst>
-              <a:ext uri="{96DAC541-7B7A-43D3-8B79-37D633B846F1}">
-                <asvg:svgBlip xmlns:asvg="http://schemas.microsoft.com/office/drawing/2016/SVG/main" r:embed="rId3"/>
-              </a:ext>
-            </a:extLst>
-          </a:blip>
-          <a:stretch>
-            <a:fillRect/>
-          </a:stretch>
-        </p:blipFill>
-        <p:spPr>
-          <a:xfrm rot="16200000">
-            <a:off x="4114800" y="2971800"/>
-            <a:ext cx="914400" cy="914400"/>
-          </a:xfrm>
-          <a:prstGeom prst="rect">
-            <a:avLst/>
-          </a:prstGeom>
-        </p:spPr>
-      </p:pic>
+            <a:ln>
+              <a:noFill/>
+            </a:ln>
+          </p:spPr>
+          <p:style>
+            <a:lnRef idx="1">
+              <a:schemeClr val="accent3"/>
+            </a:lnRef>
+            <a:fillRef idx="2">
+              <a:schemeClr val="accent3"/>
+            </a:fillRef>
+            <a:effectRef idx="1">
+              <a:schemeClr val="accent3"/>
+            </a:effectRef>
+            <a:fontRef idx="minor">
+              <a:schemeClr val="dk1"/>
+            </a:fontRef>
+          </p:style>
+          <p:txBody>
+            <a:bodyPr rtlCol="0" anchor="ctr"/>
+            <a:lstStyle/>
+            <a:p>
+              <a:pPr algn="ctr"/>
+              <a:r>
+                <a:rPr lang="zh-CN" altLang="en-US" sz="3600" dirty="0"/>
+                <a:t>滾輪</a:t>
+              </a:r>
+              <a:endParaRPr lang="en-US" altLang="zh-CN" sz="3600" dirty="0"/>
+            </a:p>
+          </p:txBody>
+        </p:sp>
+      </p:grpSp>
     </p:spTree>
     <p:extLst>
       <p:ext uri="{BB962C8B-B14F-4D97-AF65-F5344CB8AC3E}">
@@ -4170,96 +4578,115 @@
           <a:chExt cx="0" cy="0"/>
         </a:xfrm>
       </p:grpSpPr>
-      <p:pic>
-        <p:nvPicPr>
-          <p:cNvPr id="11" name="Graphic 10" descr="Checkmark">
+      <p:grpSp>
+        <p:nvGrpSpPr>
+          <p:cNvPr id="2" name="Group 1">
             <a:extLst>
               <a:ext uri="{FF2B5EF4-FFF2-40B4-BE49-F238E27FC236}">
-                <a16:creationId xmlns:a16="http://schemas.microsoft.com/office/drawing/2014/main" id="{BD6E3427-B5C3-0C40-A4B1-7CEBD1B83431}"/>
+                <a16:creationId xmlns:a16="http://schemas.microsoft.com/office/drawing/2014/main" id="{E9AA2683-A7B0-A84F-AED9-2F58D5CEE11E}"/>
               </a:ext>
             </a:extLst>
           </p:cNvPr>
-          <p:cNvPicPr>
-            <a:picLocks noChangeAspect="1"/>
-          </p:cNvPicPr>
+          <p:cNvGrpSpPr/>
           <p:nvPr/>
-        </p:nvPicPr>
-        <p:blipFill>
-          <a:blip r:embed="rId2">
-            <a:extLst>
-              <a:ext uri="{96DAC541-7B7A-43D3-8B79-37D633B846F1}">
-                <asvg:svgBlip xmlns:asvg="http://schemas.microsoft.com/office/drawing/2016/SVG/main" r:embed="rId3"/>
-              </a:ext>
-            </a:extLst>
-          </a:blip>
-          <a:stretch>
-            <a:fillRect/>
-          </a:stretch>
-        </p:blipFill>
-        <p:spPr>
+        </p:nvGrpSpPr>
+        <p:grpSpPr>
           <a:xfrm>
-            <a:off x="4114800" y="2971800"/>
-            <a:ext cx="914400" cy="914400"/>
+            <a:off x="3918857" y="2600503"/>
+            <a:ext cx="1306286" cy="1656994"/>
+            <a:chOff x="3918857" y="2229206"/>
+            <a:chExt cx="1306286" cy="1656994"/>
           </a:xfrm>
-          <a:prstGeom prst="rect">
-            <a:avLst/>
-          </a:prstGeom>
-        </p:spPr>
-      </p:pic>
-      <p:sp>
-        <p:nvSpPr>
-          <p:cNvPr id="5" name="Rectangle 4">
-            <a:extLst>
-              <a:ext uri="{FF2B5EF4-FFF2-40B4-BE49-F238E27FC236}">
-                <a16:creationId xmlns:a16="http://schemas.microsoft.com/office/drawing/2014/main" id="{F4841DAB-6795-AC4E-959E-8307ED2F1058}"/>
-              </a:ext>
-            </a:extLst>
-          </p:cNvPr>
-          <p:cNvSpPr/>
-          <p:nvPr/>
-        </p:nvSpPr>
-        <p:spPr>
-          <a:xfrm>
-            <a:off x="4114800" y="2501348"/>
-            <a:ext cx="914400" cy="470452"/>
-          </a:xfrm>
-          <a:prstGeom prst="rect">
-            <a:avLst/>
-          </a:prstGeom>
-          <a:solidFill>
-            <a:schemeClr val="bg1"/>
-          </a:solidFill>
-          <a:ln>
+        </p:grpSpPr>
+        <p:pic>
+          <p:nvPicPr>
+            <p:cNvPr id="11" name="Graphic 10" descr="Checkmark">
+              <a:extLst>
+                <a:ext uri="{FF2B5EF4-FFF2-40B4-BE49-F238E27FC236}">
+                  <a16:creationId xmlns:a16="http://schemas.microsoft.com/office/drawing/2014/main" id="{BD6E3427-B5C3-0C40-A4B1-7CEBD1B83431}"/>
+                </a:ext>
+              </a:extLst>
+            </p:cNvPr>
+            <p:cNvPicPr>
+              <a:picLocks noChangeAspect="1"/>
+            </p:cNvPicPr>
+            <p:nvPr/>
+          </p:nvPicPr>
+          <p:blipFill>
+            <a:blip r:embed="rId2">
+              <a:extLst>
+                <a:ext uri="{96DAC541-7B7A-43D3-8B79-37D633B846F1}">
+                  <asvg:svgBlip xmlns:asvg="http://schemas.microsoft.com/office/drawing/2016/SVG/main" r:embed="rId3"/>
+                </a:ext>
+              </a:extLst>
+            </a:blip>
+            <a:stretch>
+              <a:fillRect/>
+            </a:stretch>
+          </p:blipFill>
+          <p:spPr>
+            <a:xfrm>
+              <a:off x="4114800" y="2971800"/>
+              <a:ext cx="914400" cy="914400"/>
+            </a:xfrm>
+            <a:prstGeom prst="rect">
+              <a:avLst/>
+            </a:prstGeom>
+          </p:spPr>
+        </p:pic>
+        <p:sp>
+          <p:nvSpPr>
+            <p:cNvPr id="4" name="Rectangle 3">
+              <a:extLst>
+                <a:ext uri="{FF2B5EF4-FFF2-40B4-BE49-F238E27FC236}">
+                  <a16:creationId xmlns:a16="http://schemas.microsoft.com/office/drawing/2014/main" id="{D3F164F6-CA2C-A140-8BAA-A0F36A67FBEE}"/>
+                </a:ext>
+              </a:extLst>
+            </p:cNvPr>
+            <p:cNvSpPr/>
+            <p:nvPr/>
+          </p:nvSpPr>
+          <p:spPr>
+            <a:xfrm>
+              <a:off x="3918857" y="2229206"/>
+              <a:ext cx="1306286" cy="470452"/>
+            </a:xfrm>
+            <a:prstGeom prst="rect">
+              <a:avLst/>
+            </a:prstGeom>
             <a:noFill/>
-          </a:ln>
-        </p:spPr>
-        <p:style>
-          <a:lnRef idx="1">
-            <a:schemeClr val="accent3"/>
-          </a:lnRef>
-          <a:fillRef idx="2">
-            <a:schemeClr val="accent3"/>
-          </a:fillRef>
-          <a:effectRef idx="1">
-            <a:schemeClr val="accent3"/>
-          </a:effectRef>
-          <a:fontRef idx="minor">
-            <a:schemeClr val="dk1"/>
-          </a:fontRef>
-        </p:style>
-        <p:txBody>
-          <a:bodyPr rtlCol="0" anchor="ctr"/>
-          <a:lstStyle/>
-          <a:p>
-            <a:pPr algn="ctr"/>
-            <a:r>
-              <a:rPr lang="zh-CN" altLang="en-US" dirty="0"/>
-              <a:t>滾輪</a:t>
-            </a:r>
-            <a:endParaRPr lang="en-US" altLang="zh-CN" dirty="0"/>
-          </a:p>
-        </p:txBody>
-      </p:sp>
+            <a:ln>
+              <a:noFill/>
+            </a:ln>
+          </p:spPr>
+          <p:style>
+            <a:lnRef idx="1">
+              <a:schemeClr val="accent3"/>
+            </a:lnRef>
+            <a:fillRef idx="2">
+              <a:schemeClr val="accent3"/>
+            </a:fillRef>
+            <a:effectRef idx="1">
+              <a:schemeClr val="accent3"/>
+            </a:effectRef>
+            <a:fontRef idx="minor">
+              <a:schemeClr val="dk1"/>
+            </a:fontRef>
+          </p:style>
+          <p:txBody>
+            <a:bodyPr rtlCol="0" anchor="ctr"/>
+            <a:lstStyle/>
+            <a:p>
+              <a:pPr algn="ctr"/>
+              <a:r>
+                <a:rPr lang="zh-CN" altLang="en-US" sz="3600" dirty="0"/>
+                <a:t>滾輪</a:t>
+              </a:r>
+              <a:endParaRPr lang="en-US" altLang="zh-CN" sz="3600" dirty="0"/>
+            </a:p>
+          </p:txBody>
+        </p:sp>
+      </p:grpSp>
     </p:spTree>
     <p:extLst>
       <p:ext uri="{BB962C8B-B14F-4D97-AF65-F5344CB8AC3E}">
@@ -4290,96 +4717,115 @@
           <a:chExt cx="0" cy="0"/>
         </a:xfrm>
       </p:grpSpPr>
-      <p:pic>
-        <p:nvPicPr>
-          <p:cNvPr id="13" name="Graphic 12" descr="Close">
+      <p:grpSp>
+        <p:nvGrpSpPr>
+          <p:cNvPr id="2" name="Group 1">
             <a:extLst>
               <a:ext uri="{FF2B5EF4-FFF2-40B4-BE49-F238E27FC236}">
-                <a16:creationId xmlns:a16="http://schemas.microsoft.com/office/drawing/2014/main" id="{0555376C-49CB-1C4B-A4E7-F6E2C2852BA0}"/>
+                <a16:creationId xmlns:a16="http://schemas.microsoft.com/office/drawing/2014/main" id="{AE69C2F4-9C5F-1348-AD0D-031B97EEFE59}"/>
               </a:ext>
             </a:extLst>
           </p:cNvPr>
-          <p:cNvPicPr>
-            <a:picLocks noChangeAspect="1"/>
-          </p:cNvPicPr>
+          <p:cNvGrpSpPr/>
           <p:nvPr/>
-        </p:nvPicPr>
-        <p:blipFill>
-          <a:blip r:embed="rId2">
-            <a:extLst>
-              <a:ext uri="{96DAC541-7B7A-43D3-8B79-37D633B846F1}">
-                <asvg:svgBlip xmlns:asvg="http://schemas.microsoft.com/office/drawing/2016/SVG/main" r:embed="rId3"/>
-              </a:ext>
-            </a:extLst>
-          </a:blip>
-          <a:stretch>
-            <a:fillRect/>
-          </a:stretch>
-        </p:blipFill>
-        <p:spPr>
+        </p:nvGrpSpPr>
+        <p:grpSpPr>
           <a:xfrm>
-            <a:off x="4114800" y="2971800"/>
-            <a:ext cx="914400" cy="914400"/>
+            <a:off x="3918857" y="2600503"/>
+            <a:ext cx="1306286" cy="1656994"/>
+            <a:chOff x="3918857" y="2229206"/>
+            <a:chExt cx="1306286" cy="1656994"/>
           </a:xfrm>
-          <a:prstGeom prst="rect">
-            <a:avLst/>
-          </a:prstGeom>
-        </p:spPr>
-      </p:pic>
-      <p:sp>
-        <p:nvSpPr>
-          <p:cNvPr id="5" name="Rectangle 4">
-            <a:extLst>
-              <a:ext uri="{FF2B5EF4-FFF2-40B4-BE49-F238E27FC236}">
-                <a16:creationId xmlns:a16="http://schemas.microsoft.com/office/drawing/2014/main" id="{F4841DAB-6795-AC4E-959E-8307ED2F1058}"/>
-              </a:ext>
-            </a:extLst>
-          </p:cNvPr>
-          <p:cNvSpPr/>
-          <p:nvPr/>
-        </p:nvSpPr>
-        <p:spPr>
-          <a:xfrm>
-            <a:off x="4114800" y="2501348"/>
-            <a:ext cx="914400" cy="470452"/>
-          </a:xfrm>
-          <a:prstGeom prst="rect">
-            <a:avLst/>
-          </a:prstGeom>
-          <a:solidFill>
-            <a:schemeClr val="bg1"/>
-          </a:solidFill>
-          <a:ln>
+        </p:grpSpPr>
+        <p:pic>
+          <p:nvPicPr>
+            <p:cNvPr id="13" name="Graphic 12" descr="Close">
+              <a:extLst>
+                <a:ext uri="{FF2B5EF4-FFF2-40B4-BE49-F238E27FC236}">
+                  <a16:creationId xmlns:a16="http://schemas.microsoft.com/office/drawing/2014/main" id="{0555376C-49CB-1C4B-A4E7-F6E2C2852BA0}"/>
+                </a:ext>
+              </a:extLst>
+            </p:cNvPr>
+            <p:cNvPicPr>
+              <a:picLocks noChangeAspect="1"/>
+            </p:cNvPicPr>
+            <p:nvPr/>
+          </p:nvPicPr>
+          <p:blipFill>
+            <a:blip r:embed="rId2">
+              <a:extLst>
+                <a:ext uri="{96DAC541-7B7A-43D3-8B79-37D633B846F1}">
+                  <asvg:svgBlip xmlns:asvg="http://schemas.microsoft.com/office/drawing/2016/SVG/main" r:embed="rId3"/>
+                </a:ext>
+              </a:extLst>
+            </a:blip>
+            <a:stretch>
+              <a:fillRect/>
+            </a:stretch>
+          </p:blipFill>
+          <p:spPr>
+            <a:xfrm>
+              <a:off x="4114800" y="2971800"/>
+              <a:ext cx="914400" cy="914400"/>
+            </a:xfrm>
+            <a:prstGeom prst="rect">
+              <a:avLst/>
+            </a:prstGeom>
+          </p:spPr>
+        </p:pic>
+        <p:sp>
+          <p:nvSpPr>
+            <p:cNvPr id="4" name="Rectangle 3">
+              <a:extLst>
+                <a:ext uri="{FF2B5EF4-FFF2-40B4-BE49-F238E27FC236}">
+                  <a16:creationId xmlns:a16="http://schemas.microsoft.com/office/drawing/2014/main" id="{055D57C9-3C7C-5047-AD81-872F7DB31111}"/>
+                </a:ext>
+              </a:extLst>
+            </p:cNvPr>
+            <p:cNvSpPr/>
+            <p:nvPr/>
+          </p:nvSpPr>
+          <p:spPr>
+            <a:xfrm>
+              <a:off x="3918857" y="2229206"/>
+              <a:ext cx="1306286" cy="470452"/>
+            </a:xfrm>
+            <a:prstGeom prst="rect">
+              <a:avLst/>
+            </a:prstGeom>
             <a:noFill/>
-          </a:ln>
-        </p:spPr>
-        <p:style>
-          <a:lnRef idx="1">
-            <a:schemeClr val="accent3"/>
-          </a:lnRef>
-          <a:fillRef idx="2">
-            <a:schemeClr val="accent3"/>
-          </a:fillRef>
-          <a:effectRef idx="1">
-            <a:schemeClr val="accent3"/>
-          </a:effectRef>
-          <a:fontRef idx="minor">
-            <a:schemeClr val="dk1"/>
-          </a:fontRef>
-        </p:style>
-        <p:txBody>
-          <a:bodyPr rtlCol="0" anchor="ctr"/>
-          <a:lstStyle/>
-          <a:p>
-            <a:pPr algn="ctr"/>
-            <a:r>
-              <a:rPr lang="zh-CN" altLang="en-US" dirty="0"/>
-              <a:t>滾輪</a:t>
-            </a:r>
-            <a:endParaRPr lang="en-US" altLang="zh-CN" dirty="0"/>
-          </a:p>
-        </p:txBody>
-      </p:sp>
+            <a:ln>
+              <a:noFill/>
+            </a:ln>
+          </p:spPr>
+          <p:style>
+            <a:lnRef idx="1">
+              <a:schemeClr val="accent3"/>
+            </a:lnRef>
+            <a:fillRef idx="2">
+              <a:schemeClr val="accent3"/>
+            </a:fillRef>
+            <a:effectRef idx="1">
+              <a:schemeClr val="accent3"/>
+            </a:effectRef>
+            <a:fontRef idx="minor">
+              <a:schemeClr val="dk1"/>
+            </a:fontRef>
+          </p:style>
+          <p:txBody>
+            <a:bodyPr rtlCol="0" anchor="ctr"/>
+            <a:lstStyle/>
+            <a:p>
+              <a:pPr algn="ctr"/>
+              <a:r>
+                <a:rPr lang="zh-CN" altLang="en-US" sz="3600" dirty="0"/>
+                <a:t>滾輪</a:t>
+              </a:r>
+              <a:endParaRPr lang="en-US" altLang="zh-CN" sz="3600" dirty="0"/>
+            </a:p>
+          </p:txBody>
+        </p:sp>
+      </p:grpSp>
     </p:spTree>
     <p:extLst>
       <p:ext uri="{BB962C8B-B14F-4D97-AF65-F5344CB8AC3E}">
@@ -4410,96 +4856,115 @@
           <a:chExt cx="0" cy="0"/>
         </a:xfrm>
       </p:grpSpPr>
-      <p:sp>
-        <p:nvSpPr>
-          <p:cNvPr id="5" name="Rectangle 4">
+      <p:grpSp>
+        <p:nvGrpSpPr>
+          <p:cNvPr id="2" name="Group 1">
             <a:extLst>
               <a:ext uri="{FF2B5EF4-FFF2-40B4-BE49-F238E27FC236}">
-                <a16:creationId xmlns:a16="http://schemas.microsoft.com/office/drawing/2014/main" id="{F4841DAB-6795-AC4E-959E-8307ED2F1058}"/>
+                <a16:creationId xmlns:a16="http://schemas.microsoft.com/office/drawing/2014/main" id="{D4CA6618-745A-9843-829A-ABD4E766F614}"/>
               </a:ext>
             </a:extLst>
           </p:cNvPr>
-          <p:cNvSpPr/>
+          <p:cNvGrpSpPr/>
           <p:nvPr/>
-        </p:nvSpPr>
-        <p:spPr>
+        </p:nvGrpSpPr>
+        <p:grpSpPr>
           <a:xfrm>
-            <a:off x="4114800" y="2501348"/>
-            <a:ext cx="914400" cy="470452"/>
+            <a:off x="3918857" y="2600503"/>
+            <a:ext cx="1306286" cy="1656994"/>
+            <a:chOff x="3918857" y="2229206"/>
+            <a:chExt cx="1306286" cy="1656994"/>
           </a:xfrm>
-          <a:prstGeom prst="rect">
-            <a:avLst/>
-          </a:prstGeom>
-          <a:solidFill>
-            <a:schemeClr val="bg1"/>
-          </a:solidFill>
-          <a:ln>
+        </p:grpSpPr>
+        <p:pic>
+          <p:nvPicPr>
+            <p:cNvPr id="7" name="Graphic 6" descr="Line arrow Straight">
+              <a:extLst>
+                <a:ext uri="{FF2B5EF4-FFF2-40B4-BE49-F238E27FC236}">
+                  <a16:creationId xmlns:a16="http://schemas.microsoft.com/office/drawing/2014/main" id="{221EEDDD-BC39-D54C-8A20-6D0CBAA89E8A}"/>
+                </a:ext>
+              </a:extLst>
+            </p:cNvPr>
+            <p:cNvPicPr>
+              <a:picLocks noChangeAspect="1"/>
+            </p:cNvPicPr>
+            <p:nvPr/>
+          </p:nvPicPr>
+          <p:blipFill>
+            <a:blip r:embed="rId2">
+              <a:extLst>
+                <a:ext uri="{96DAC541-7B7A-43D3-8B79-37D633B846F1}">
+                  <asvg:svgBlip xmlns:asvg="http://schemas.microsoft.com/office/drawing/2016/SVG/main" r:embed="rId3"/>
+                </a:ext>
+              </a:extLst>
+            </a:blip>
+            <a:stretch>
+              <a:fillRect/>
+            </a:stretch>
+          </p:blipFill>
+          <p:spPr>
+            <a:xfrm>
+              <a:off x="4114800" y="2971800"/>
+              <a:ext cx="914400" cy="914400"/>
+            </a:xfrm>
+            <a:prstGeom prst="rect">
+              <a:avLst/>
+            </a:prstGeom>
+          </p:spPr>
+        </p:pic>
+        <p:sp>
+          <p:nvSpPr>
+            <p:cNvPr id="4" name="Rectangle 3">
+              <a:extLst>
+                <a:ext uri="{FF2B5EF4-FFF2-40B4-BE49-F238E27FC236}">
+                  <a16:creationId xmlns:a16="http://schemas.microsoft.com/office/drawing/2014/main" id="{1A51E0EE-E5FF-0649-8F1C-40614F78DFA8}"/>
+                </a:ext>
+              </a:extLst>
+            </p:cNvPr>
+            <p:cNvSpPr/>
+            <p:nvPr/>
+          </p:nvSpPr>
+          <p:spPr>
+            <a:xfrm>
+              <a:off x="3918857" y="2229206"/>
+              <a:ext cx="1306286" cy="470452"/>
+            </a:xfrm>
+            <a:prstGeom prst="rect">
+              <a:avLst/>
+            </a:prstGeom>
             <a:noFill/>
-          </a:ln>
-        </p:spPr>
-        <p:style>
-          <a:lnRef idx="1">
-            <a:schemeClr val="accent3"/>
-          </a:lnRef>
-          <a:fillRef idx="2">
-            <a:schemeClr val="accent3"/>
-          </a:fillRef>
-          <a:effectRef idx="1">
-            <a:schemeClr val="accent3"/>
-          </a:effectRef>
-          <a:fontRef idx="minor">
-            <a:schemeClr val="dk1"/>
-          </a:fontRef>
-        </p:style>
-        <p:txBody>
-          <a:bodyPr rtlCol="0" anchor="ctr"/>
-          <a:lstStyle/>
-          <a:p>
-            <a:pPr algn="ctr"/>
-            <a:r>
-              <a:rPr lang="zh-CN" altLang="en-US" dirty="0"/>
-              <a:t>搖桿</a:t>
-            </a:r>
-            <a:endParaRPr lang="en-US" altLang="zh-CN" dirty="0"/>
-          </a:p>
-        </p:txBody>
-      </p:sp>
-      <p:pic>
-        <p:nvPicPr>
-          <p:cNvPr id="7" name="Graphic 6" descr="Line arrow Straight">
-            <a:extLst>
-              <a:ext uri="{FF2B5EF4-FFF2-40B4-BE49-F238E27FC236}">
-                <a16:creationId xmlns:a16="http://schemas.microsoft.com/office/drawing/2014/main" id="{221EEDDD-BC39-D54C-8A20-6D0CBAA89E8A}"/>
-              </a:ext>
-            </a:extLst>
-          </p:cNvPr>
-          <p:cNvPicPr>
-            <a:picLocks noChangeAspect="1"/>
-          </p:cNvPicPr>
-          <p:nvPr/>
-        </p:nvPicPr>
-        <p:blipFill>
-          <a:blip r:embed="rId2">
-            <a:extLst>
-              <a:ext uri="{96DAC541-7B7A-43D3-8B79-37D633B846F1}">
-                <asvg:svgBlip xmlns:asvg="http://schemas.microsoft.com/office/drawing/2016/SVG/main" r:embed="rId3"/>
-              </a:ext>
-            </a:extLst>
-          </a:blip>
-          <a:stretch>
-            <a:fillRect/>
-          </a:stretch>
-        </p:blipFill>
-        <p:spPr>
-          <a:xfrm>
-            <a:off x="4114800" y="2971800"/>
-            <a:ext cx="914400" cy="914400"/>
-          </a:xfrm>
-          <a:prstGeom prst="rect">
-            <a:avLst/>
-          </a:prstGeom>
-        </p:spPr>
-      </p:pic>
+            <a:ln>
+              <a:noFill/>
+            </a:ln>
+          </p:spPr>
+          <p:style>
+            <a:lnRef idx="1">
+              <a:schemeClr val="accent3"/>
+            </a:lnRef>
+            <a:fillRef idx="2">
+              <a:schemeClr val="accent3"/>
+            </a:fillRef>
+            <a:effectRef idx="1">
+              <a:schemeClr val="accent3"/>
+            </a:effectRef>
+            <a:fontRef idx="minor">
+              <a:schemeClr val="dk1"/>
+            </a:fontRef>
+          </p:style>
+          <p:txBody>
+            <a:bodyPr rtlCol="0" anchor="ctr"/>
+            <a:lstStyle/>
+            <a:p>
+              <a:pPr algn="ctr"/>
+              <a:r>
+                <a:rPr lang="zh-CN" altLang="en-US" sz="3600" dirty="0"/>
+                <a:t>搖桿</a:t>
+              </a:r>
+              <a:endParaRPr lang="en-US" altLang="zh-CN" sz="3600" dirty="0"/>
+            </a:p>
+          </p:txBody>
+        </p:sp>
+      </p:grpSp>
     </p:spTree>
     <p:extLst>
       <p:ext uri="{BB962C8B-B14F-4D97-AF65-F5344CB8AC3E}">
@@ -4530,96 +4995,115 @@
           <a:chExt cx="0" cy="0"/>
         </a:xfrm>
       </p:grpSpPr>
-      <p:sp>
-        <p:nvSpPr>
-          <p:cNvPr id="5" name="Rectangle 4">
+      <p:grpSp>
+        <p:nvGrpSpPr>
+          <p:cNvPr id="2" name="Group 1">
             <a:extLst>
               <a:ext uri="{FF2B5EF4-FFF2-40B4-BE49-F238E27FC236}">
-                <a16:creationId xmlns:a16="http://schemas.microsoft.com/office/drawing/2014/main" id="{F4841DAB-6795-AC4E-959E-8307ED2F1058}"/>
+                <a16:creationId xmlns:a16="http://schemas.microsoft.com/office/drawing/2014/main" id="{2FD9EBCA-4DA9-BB4D-95DA-2650D15779A0}"/>
               </a:ext>
             </a:extLst>
           </p:cNvPr>
-          <p:cNvSpPr/>
+          <p:cNvGrpSpPr/>
           <p:nvPr/>
-        </p:nvSpPr>
-        <p:spPr>
+        </p:nvGrpSpPr>
+        <p:grpSpPr>
           <a:xfrm>
-            <a:off x="4114800" y="2501348"/>
-            <a:ext cx="914400" cy="470452"/>
+            <a:off x="3918857" y="2600503"/>
+            <a:ext cx="1306286" cy="1656994"/>
+            <a:chOff x="3918857" y="2229206"/>
+            <a:chExt cx="1306286" cy="1656994"/>
           </a:xfrm>
-          <a:prstGeom prst="rect">
-            <a:avLst/>
-          </a:prstGeom>
-          <a:solidFill>
-            <a:schemeClr val="bg1"/>
-          </a:solidFill>
-          <a:ln>
+        </p:grpSpPr>
+        <p:pic>
+          <p:nvPicPr>
+            <p:cNvPr id="7" name="Graphic 6" descr="Line arrow Straight">
+              <a:extLst>
+                <a:ext uri="{FF2B5EF4-FFF2-40B4-BE49-F238E27FC236}">
+                  <a16:creationId xmlns:a16="http://schemas.microsoft.com/office/drawing/2014/main" id="{221EEDDD-BC39-D54C-8A20-6D0CBAA89E8A}"/>
+                </a:ext>
+              </a:extLst>
+            </p:cNvPr>
+            <p:cNvPicPr>
+              <a:picLocks noChangeAspect="1"/>
+            </p:cNvPicPr>
+            <p:nvPr/>
+          </p:nvPicPr>
+          <p:blipFill>
+            <a:blip r:embed="rId2">
+              <a:extLst>
+                <a:ext uri="{96DAC541-7B7A-43D3-8B79-37D633B846F1}">
+                  <asvg:svgBlip xmlns:asvg="http://schemas.microsoft.com/office/drawing/2016/SVG/main" r:embed="rId3"/>
+                </a:ext>
+              </a:extLst>
+            </a:blip>
+            <a:stretch>
+              <a:fillRect/>
+            </a:stretch>
+          </p:blipFill>
+          <p:spPr>
+            <a:xfrm rot="10800000">
+              <a:off x="4114800" y="2971800"/>
+              <a:ext cx="914400" cy="914400"/>
+            </a:xfrm>
+            <a:prstGeom prst="rect">
+              <a:avLst/>
+            </a:prstGeom>
+          </p:spPr>
+        </p:pic>
+        <p:sp>
+          <p:nvSpPr>
+            <p:cNvPr id="4" name="Rectangle 3">
+              <a:extLst>
+                <a:ext uri="{FF2B5EF4-FFF2-40B4-BE49-F238E27FC236}">
+                  <a16:creationId xmlns:a16="http://schemas.microsoft.com/office/drawing/2014/main" id="{3A51B453-0025-4048-907F-572A75A70527}"/>
+                </a:ext>
+              </a:extLst>
+            </p:cNvPr>
+            <p:cNvSpPr/>
+            <p:nvPr/>
+          </p:nvSpPr>
+          <p:spPr>
+            <a:xfrm>
+              <a:off x="3918857" y="2229206"/>
+              <a:ext cx="1306286" cy="470452"/>
+            </a:xfrm>
+            <a:prstGeom prst="rect">
+              <a:avLst/>
+            </a:prstGeom>
             <a:noFill/>
-          </a:ln>
-        </p:spPr>
-        <p:style>
-          <a:lnRef idx="1">
-            <a:schemeClr val="accent3"/>
-          </a:lnRef>
-          <a:fillRef idx="2">
-            <a:schemeClr val="accent3"/>
-          </a:fillRef>
-          <a:effectRef idx="1">
-            <a:schemeClr val="accent3"/>
-          </a:effectRef>
-          <a:fontRef idx="minor">
-            <a:schemeClr val="dk1"/>
-          </a:fontRef>
-        </p:style>
-        <p:txBody>
-          <a:bodyPr rtlCol="0" anchor="ctr"/>
-          <a:lstStyle/>
-          <a:p>
-            <a:pPr algn="ctr"/>
-            <a:r>
-              <a:rPr lang="zh-CN" altLang="en-US" dirty="0"/>
-              <a:t>搖桿</a:t>
-            </a:r>
-            <a:endParaRPr lang="en-US" altLang="zh-CN" dirty="0"/>
-          </a:p>
-        </p:txBody>
-      </p:sp>
-      <p:pic>
-        <p:nvPicPr>
-          <p:cNvPr id="7" name="Graphic 6" descr="Line arrow Straight">
-            <a:extLst>
-              <a:ext uri="{FF2B5EF4-FFF2-40B4-BE49-F238E27FC236}">
-                <a16:creationId xmlns:a16="http://schemas.microsoft.com/office/drawing/2014/main" id="{221EEDDD-BC39-D54C-8A20-6D0CBAA89E8A}"/>
-              </a:ext>
-            </a:extLst>
-          </p:cNvPr>
-          <p:cNvPicPr>
-            <a:picLocks noChangeAspect="1"/>
-          </p:cNvPicPr>
-          <p:nvPr/>
-        </p:nvPicPr>
-        <p:blipFill>
-          <a:blip r:embed="rId2">
-            <a:extLst>
-              <a:ext uri="{96DAC541-7B7A-43D3-8B79-37D633B846F1}">
-                <asvg:svgBlip xmlns:asvg="http://schemas.microsoft.com/office/drawing/2016/SVG/main" r:embed="rId3"/>
-              </a:ext>
-            </a:extLst>
-          </a:blip>
-          <a:stretch>
-            <a:fillRect/>
-          </a:stretch>
-        </p:blipFill>
-        <p:spPr>
-          <a:xfrm rot="10800000">
-            <a:off x="4114800" y="2971800"/>
-            <a:ext cx="914400" cy="914400"/>
-          </a:xfrm>
-          <a:prstGeom prst="rect">
-            <a:avLst/>
-          </a:prstGeom>
-        </p:spPr>
-      </p:pic>
+            <a:ln>
+              <a:noFill/>
+            </a:ln>
+          </p:spPr>
+          <p:style>
+            <a:lnRef idx="1">
+              <a:schemeClr val="accent3"/>
+            </a:lnRef>
+            <a:fillRef idx="2">
+              <a:schemeClr val="accent3"/>
+            </a:fillRef>
+            <a:effectRef idx="1">
+              <a:schemeClr val="accent3"/>
+            </a:effectRef>
+            <a:fontRef idx="minor">
+              <a:schemeClr val="dk1"/>
+            </a:fontRef>
+          </p:style>
+          <p:txBody>
+            <a:bodyPr rtlCol="0" anchor="ctr"/>
+            <a:lstStyle/>
+            <a:p>
+              <a:pPr algn="ctr"/>
+              <a:r>
+                <a:rPr lang="zh-CN" altLang="en-US" sz="3600" dirty="0"/>
+                <a:t>搖桿</a:t>
+              </a:r>
+              <a:endParaRPr lang="en-US" altLang="zh-CN" sz="3600" dirty="0"/>
+            </a:p>
+          </p:txBody>
+        </p:sp>
+      </p:grpSp>
     </p:spTree>
     <p:extLst>
       <p:ext uri="{BB962C8B-B14F-4D97-AF65-F5344CB8AC3E}">
@@ -4650,96 +5134,115 @@
           <a:chExt cx="0" cy="0"/>
         </a:xfrm>
       </p:grpSpPr>
-      <p:sp>
-        <p:nvSpPr>
-          <p:cNvPr id="5" name="Rectangle 4">
+      <p:grpSp>
+        <p:nvGrpSpPr>
+          <p:cNvPr id="2" name="Group 1">
             <a:extLst>
               <a:ext uri="{FF2B5EF4-FFF2-40B4-BE49-F238E27FC236}">
-                <a16:creationId xmlns:a16="http://schemas.microsoft.com/office/drawing/2014/main" id="{F4841DAB-6795-AC4E-959E-8307ED2F1058}"/>
+                <a16:creationId xmlns:a16="http://schemas.microsoft.com/office/drawing/2014/main" id="{9CF519F3-0E36-494B-BAFD-40005B59961F}"/>
               </a:ext>
             </a:extLst>
           </p:cNvPr>
-          <p:cNvSpPr/>
+          <p:cNvGrpSpPr/>
           <p:nvPr/>
-        </p:nvSpPr>
-        <p:spPr>
+        </p:nvGrpSpPr>
+        <p:grpSpPr>
           <a:xfrm>
-            <a:off x="4114800" y="2501348"/>
-            <a:ext cx="914400" cy="470452"/>
+            <a:off x="3918857" y="2600503"/>
+            <a:ext cx="1306286" cy="1656994"/>
+            <a:chOff x="3918857" y="2229206"/>
+            <a:chExt cx="1306286" cy="1656994"/>
           </a:xfrm>
-          <a:prstGeom prst="rect">
-            <a:avLst/>
-          </a:prstGeom>
-          <a:solidFill>
-            <a:schemeClr val="bg1"/>
-          </a:solidFill>
-          <a:ln>
+        </p:grpSpPr>
+        <p:pic>
+          <p:nvPicPr>
+            <p:cNvPr id="7" name="Graphic 6" descr="Line arrow Straight">
+              <a:extLst>
+                <a:ext uri="{FF2B5EF4-FFF2-40B4-BE49-F238E27FC236}">
+                  <a16:creationId xmlns:a16="http://schemas.microsoft.com/office/drawing/2014/main" id="{221EEDDD-BC39-D54C-8A20-6D0CBAA89E8A}"/>
+                </a:ext>
+              </a:extLst>
+            </p:cNvPr>
+            <p:cNvPicPr>
+              <a:picLocks noChangeAspect="1"/>
+            </p:cNvPicPr>
+            <p:nvPr/>
+          </p:nvPicPr>
+          <p:blipFill>
+            <a:blip r:embed="rId2">
+              <a:extLst>
+                <a:ext uri="{96DAC541-7B7A-43D3-8B79-37D633B846F1}">
+                  <asvg:svgBlip xmlns:asvg="http://schemas.microsoft.com/office/drawing/2016/SVG/main" r:embed="rId3"/>
+                </a:ext>
+              </a:extLst>
+            </a:blip>
+            <a:stretch>
+              <a:fillRect/>
+            </a:stretch>
+          </p:blipFill>
+          <p:spPr>
+            <a:xfrm rot="5400000">
+              <a:off x="4114800" y="2971800"/>
+              <a:ext cx="914400" cy="914400"/>
+            </a:xfrm>
+            <a:prstGeom prst="rect">
+              <a:avLst/>
+            </a:prstGeom>
+          </p:spPr>
+        </p:pic>
+        <p:sp>
+          <p:nvSpPr>
+            <p:cNvPr id="4" name="Rectangle 3">
+              <a:extLst>
+                <a:ext uri="{FF2B5EF4-FFF2-40B4-BE49-F238E27FC236}">
+                  <a16:creationId xmlns:a16="http://schemas.microsoft.com/office/drawing/2014/main" id="{9853F282-6A4B-A046-B952-B7865C60A6B2}"/>
+                </a:ext>
+              </a:extLst>
+            </p:cNvPr>
+            <p:cNvSpPr/>
+            <p:nvPr/>
+          </p:nvSpPr>
+          <p:spPr>
+            <a:xfrm>
+              <a:off x="3918857" y="2229206"/>
+              <a:ext cx="1306286" cy="470452"/>
+            </a:xfrm>
+            <a:prstGeom prst="rect">
+              <a:avLst/>
+            </a:prstGeom>
             <a:noFill/>
-          </a:ln>
-        </p:spPr>
-        <p:style>
-          <a:lnRef idx="1">
-            <a:schemeClr val="accent3"/>
-          </a:lnRef>
-          <a:fillRef idx="2">
-            <a:schemeClr val="accent3"/>
-          </a:fillRef>
-          <a:effectRef idx="1">
-            <a:schemeClr val="accent3"/>
-          </a:effectRef>
-          <a:fontRef idx="minor">
-            <a:schemeClr val="dk1"/>
-          </a:fontRef>
-        </p:style>
-        <p:txBody>
-          <a:bodyPr rtlCol="0" anchor="ctr"/>
-          <a:lstStyle/>
-          <a:p>
-            <a:pPr algn="ctr"/>
-            <a:r>
-              <a:rPr lang="zh-CN" altLang="en-US" dirty="0"/>
-              <a:t>搖桿</a:t>
-            </a:r>
-            <a:endParaRPr lang="en-US" altLang="zh-CN" dirty="0"/>
-          </a:p>
-        </p:txBody>
-      </p:sp>
-      <p:pic>
-        <p:nvPicPr>
-          <p:cNvPr id="7" name="Graphic 6" descr="Line arrow Straight">
-            <a:extLst>
-              <a:ext uri="{FF2B5EF4-FFF2-40B4-BE49-F238E27FC236}">
-                <a16:creationId xmlns:a16="http://schemas.microsoft.com/office/drawing/2014/main" id="{221EEDDD-BC39-D54C-8A20-6D0CBAA89E8A}"/>
-              </a:ext>
-            </a:extLst>
-          </p:cNvPr>
-          <p:cNvPicPr>
-            <a:picLocks noChangeAspect="1"/>
-          </p:cNvPicPr>
-          <p:nvPr/>
-        </p:nvPicPr>
-        <p:blipFill>
-          <a:blip r:embed="rId2">
-            <a:extLst>
-              <a:ext uri="{96DAC541-7B7A-43D3-8B79-37D633B846F1}">
-                <asvg:svgBlip xmlns:asvg="http://schemas.microsoft.com/office/drawing/2016/SVG/main" r:embed="rId3"/>
-              </a:ext>
-            </a:extLst>
-          </a:blip>
-          <a:stretch>
-            <a:fillRect/>
-          </a:stretch>
-        </p:blipFill>
-        <p:spPr>
-          <a:xfrm rot="5400000">
-            <a:off x="4114800" y="2971800"/>
-            <a:ext cx="914400" cy="914400"/>
-          </a:xfrm>
-          <a:prstGeom prst="rect">
-            <a:avLst/>
-          </a:prstGeom>
-        </p:spPr>
-      </p:pic>
+            <a:ln>
+              <a:noFill/>
+            </a:ln>
+          </p:spPr>
+          <p:style>
+            <a:lnRef idx="1">
+              <a:schemeClr val="accent3"/>
+            </a:lnRef>
+            <a:fillRef idx="2">
+              <a:schemeClr val="accent3"/>
+            </a:fillRef>
+            <a:effectRef idx="1">
+              <a:schemeClr val="accent3"/>
+            </a:effectRef>
+            <a:fontRef idx="minor">
+              <a:schemeClr val="dk1"/>
+            </a:fontRef>
+          </p:style>
+          <p:txBody>
+            <a:bodyPr rtlCol="0" anchor="ctr"/>
+            <a:lstStyle/>
+            <a:p>
+              <a:pPr algn="ctr"/>
+              <a:r>
+                <a:rPr lang="zh-CN" altLang="en-US" sz="3600" dirty="0"/>
+                <a:t>搖桿</a:t>
+              </a:r>
+              <a:endParaRPr lang="en-US" altLang="zh-CN" sz="3600" dirty="0"/>
+            </a:p>
+          </p:txBody>
+        </p:sp>
+      </p:grpSp>
     </p:spTree>
     <p:extLst>
       <p:ext uri="{BB962C8B-B14F-4D97-AF65-F5344CB8AC3E}">

</xml_diff>

<commit_message>
Add ACC practice trials. Finish verion 2.0.
</commit_message>
<xml_diff>
--- a/WheelOSDtest/StimulusPNG.pptx
+++ b/WheelOSDtest/StimulusPNG.pptx
@@ -5,7 +5,7 @@
     <p:sldMasterId id="2147483660" r:id="rId1"/>
   </p:sldMasterIdLst>
   <p:notesMasterIdLst>
-    <p:notesMasterId r:id="rId24"/>
+    <p:notesMasterId r:id="rId26"/>
   </p:notesMasterIdLst>
   <p:sldIdLst>
     <p:sldId id="256" r:id="rId2"/>
@@ -26,10 +26,12 @@
     <p:sldId id="271" r:id="rId17"/>
     <p:sldId id="272" r:id="rId18"/>
     <p:sldId id="274" r:id="rId19"/>
-    <p:sldId id="273" r:id="rId20"/>
-    <p:sldId id="276" r:id="rId21"/>
-    <p:sldId id="275" r:id="rId22"/>
-    <p:sldId id="277" r:id="rId23"/>
+    <p:sldId id="276" r:id="rId20"/>
+    <p:sldId id="275" r:id="rId21"/>
+    <p:sldId id="277" r:id="rId22"/>
+    <p:sldId id="280" r:id="rId23"/>
+    <p:sldId id="278" r:id="rId24"/>
+    <p:sldId id="279" r:id="rId25"/>
   </p:sldIdLst>
   <p:sldSz cx="9144000" cy="6858000" type="screen4x3"/>
   <p:notesSz cx="6858000" cy="9144000"/>
@@ -218,7 +220,7 @@
           <a:p>
             <a:fld id="{F2BFC798-CD41-8F4D-B58F-44B3A40DE107}" type="datetimeFigureOut">
               <a:rPr lang="en-TW" smtClean="0"/>
-              <a:t>2020/5/5</a:t>
+              <a:t>2020/5/11</a:t>
             </a:fld>
             <a:endParaRPr lang="en-TW"/>
           </a:p>
@@ -701,7 +703,7 @@
           <a:p>
             <a:fld id="{CC65E4BC-1554-EE47-8BC3-016EB7E374AC}" type="datetimeFigureOut">
               <a:rPr lang="en-TW" smtClean="0"/>
-              <a:t>2020/5/5</a:t>
+              <a:t>2020/5/11</a:t>
             </a:fld>
             <a:endParaRPr lang="en-TW"/>
           </a:p>
@@ -871,7 +873,7 @@
           <a:p>
             <a:fld id="{CC65E4BC-1554-EE47-8BC3-016EB7E374AC}" type="datetimeFigureOut">
               <a:rPr lang="en-TW" smtClean="0"/>
-              <a:t>2020/5/5</a:t>
+              <a:t>2020/5/11</a:t>
             </a:fld>
             <a:endParaRPr lang="en-TW"/>
           </a:p>
@@ -1051,7 +1053,7 @@
           <a:p>
             <a:fld id="{CC65E4BC-1554-EE47-8BC3-016EB7E374AC}" type="datetimeFigureOut">
               <a:rPr lang="en-TW" smtClean="0"/>
-              <a:t>2020/5/5</a:t>
+              <a:t>2020/5/11</a:t>
             </a:fld>
             <a:endParaRPr lang="en-TW"/>
           </a:p>
@@ -1221,7 +1223,7 @@
           <a:p>
             <a:fld id="{CC65E4BC-1554-EE47-8BC3-016EB7E374AC}" type="datetimeFigureOut">
               <a:rPr lang="en-TW" smtClean="0"/>
-              <a:t>2020/5/5</a:t>
+              <a:t>2020/5/11</a:t>
             </a:fld>
             <a:endParaRPr lang="en-TW"/>
           </a:p>
@@ -1465,7 +1467,7 @@
           <a:p>
             <a:fld id="{CC65E4BC-1554-EE47-8BC3-016EB7E374AC}" type="datetimeFigureOut">
               <a:rPr lang="en-TW" smtClean="0"/>
-              <a:t>2020/5/5</a:t>
+              <a:t>2020/5/11</a:t>
             </a:fld>
             <a:endParaRPr lang="en-TW"/>
           </a:p>
@@ -1697,7 +1699,7 @@
           <a:p>
             <a:fld id="{CC65E4BC-1554-EE47-8BC3-016EB7E374AC}" type="datetimeFigureOut">
               <a:rPr lang="en-TW" smtClean="0"/>
-              <a:t>2020/5/5</a:t>
+              <a:t>2020/5/11</a:t>
             </a:fld>
             <a:endParaRPr lang="en-TW"/>
           </a:p>
@@ -2064,7 +2066,7 @@
           <a:p>
             <a:fld id="{CC65E4BC-1554-EE47-8BC3-016EB7E374AC}" type="datetimeFigureOut">
               <a:rPr lang="en-TW" smtClean="0"/>
-              <a:t>2020/5/5</a:t>
+              <a:t>2020/5/11</a:t>
             </a:fld>
             <a:endParaRPr lang="en-TW"/>
           </a:p>
@@ -2182,7 +2184,7 @@
           <a:p>
             <a:fld id="{CC65E4BC-1554-EE47-8BC3-016EB7E374AC}" type="datetimeFigureOut">
               <a:rPr lang="en-TW" smtClean="0"/>
-              <a:t>2020/5/5</a:t>
+              <a:t>2020/5/11</a:t>
             </a:fld>
             <a:endParaRPr lang="en-TW"/>
           </a:p>
@@ -2277,7 +2279,7 @@
           <a:p>
             <a:fld id="{CC65E4BC-1554-EE47-8BC3-016EB7E374AC}" type="datetimeFigureOut">
               <a:rPr lang="en-TW" smtClean="0"/>
-              <a:t>2020/5/5</a:t>
+              <a:t>2020/5/11</a:t>
             </a:fld>
             <a:endParaRPr lang="en-TW"/>
           </a:p>
@@ -2554,7 +2556,7 @@
           <a:p>
             <a:fld id="{CC65E4BC-1554-EE47-8BC3-016EB7E374AC}" type="datetimeFigureOut">
               <a:rPr lang="en-TW" smtClean="0"/>
-              <a:t>2020/5/5</a:t>
+              <a:t>2020/5/11</a:t>
             </a:fld>
             <a:endParaRPr lang="en-TW"/>
           </a:p>
@@ -2811,7 +2813,7 @@
           <a:p>
             <a:fld id="{CC65E4BC-1554-EE47-8BC3-016EB7E374AC}" type="datetimeFigureOut">
               <a:rPr lang="en-TW" smtClean="0"/>
-              <a:t>2020/5/5</a:t>
+              <a:t>2020/5/11</a:t>
             </a:fld>
             <a:endParaRPr lang="en-TW"/>
           </a:p>
@@ -3024,7 +3026,7 @@
           <a:p>
             <a:fld id="{CC65E4BC-1554-EE47-8BC3-016EB7E374AC}" type="datetimeFigureOut">
               <a:rPr lang="en-TW" smtClean="0"/>
-              <a:t>2020/5/5</a:t>
+              <a:t>2020/5/11</a:t>
             </a:fld>
             <a:endParaRPr lang="en-TW"/>
           </a:p>
@@ -4680,7 +4682,7 @@
     </p:spTree>
     <p:extLst>
       <p:ext uri="{BB962C8B-B14F-4D97-AF65-F5344CB8AC3E}">
-        <p14:creationId xmlns:p14="http://schemas.microsoft.com/office/powerpoint/2010/main" val="3122058459"/>
+        <p14:creationId xmlns:p14="http://schemas.microsoft.com/office/powerpoint/2010/main" val="1085678462"/>
       </p:ext>
     </p:extLst>
   </p:cSld>
@@ -4860,8 +4862,8 @@
         </p:nvSpPr>
         <p:spPr>
           <a:xfrm>
-            <a:off x="2905125" y="3026229"/>
-            <a:ext cx="3333749" cy="805542"/>
+            <a:off x="2595562" y="3026229"/>
+            <a:ext cx="3952875" cy="805542"/>
           </a:xfrm>
           <a:prstGeom prst="rect">
             <a:avLst/>
@@ -4896,7 +4898,7 @@
                   <a:schemeClr val="accent1"/>
                 </a:solidFill>
               </a:rPr>
-              <a:t>練習階段完成</a:t>
+              <a:t>接下來</a:t>
             </a:r>
             <a:endParaRPr lang="en-US" altLang="zh-CN" sz="3600" b="1" dirty="0">
               <a:solidFill>
@@ -4904,12 +4906,44 @@
               </a:solidFill>
             </a:endParaRPr>
           </a:p>
+          <a:p>
+            <a:pPr algn="ctr"/>
+            <a:r>
+              <a:rPr lang="zh-CN" altLang="en-US" sz="3600" b="1" dirty="0">
+                <a:solidFill>
+                  <a:schemeClr val="accent1"/>
+                </a:solidFill>
+              </a:rPr>
+              <a:t>請使用</a:t>
+            </a:r>
+            <a:r>
+              <a:rPr lang="zh-CN" altLang="en-US" sz="3600" b="1" dirty="0">
+                <a:solidFill>
+                  <a:schemeClr val="accent2"/>
+                </a:solidFill>
+              </a:rPr>
+              <a:t>滾輪</a:t>
+            </a:r>
+            <a:r>
+              <a:rPr lang="zh-CN" altLang="en-US" sz="3600" b="1" dirty="0">
+                <a:solidFill>
+                  <a:schemeClr val="accent1"/>
+                </a:solidFill>
+              </a:rPr>
+              <a:t>作答</a:t>
+            </a:r>
+            <a:endParaRPr lang="en-US" altLang="zh-CN" sz="3600" b="1" dirty="0">
+              <a:solidFill>
+                <a:schemeClr val="accent1"/>
+              </a:solidFill>
+            </a:endParaRPr>
+          </a:p>
         </p:txBody>
       </p:sp>
     </p:spTree>
     <p:extLst>
       <p:ext uri="{BB962C8B-B14F-4D97-AF65-F5344CB8AC3E}">
-        <p14:creationId xmlns:p14="http://schemas.microsoft.com/office/powerpoint/2010/main" val="1085678462"/>
+        <p14:creationId xmlns:p14="http://schemas.microsoft.com/office/powerpoint/2010/main" val="525268256"/>
       </p:ext>
     </p:extLst>
   </p:cSld>
@@ -5010,7 +5044,7 @@
                   <a:schemeClr val="accent2"/>
                 </a:solidFill>
               </a:rPr>
-              <a:t>滾輪</a:t>
+              <a:t>搖桿</a:t>
             </a:r>
             <a:r>
               <a:rPr lang="zh-CN" altLang="en-US" sz="3600" b="1" dirty="0">
@@ -5031,7 +5065,7 @@
     </p:spTree>
     <p:extLst>
       <p:ext uri="{BB962C8B-B14F-4D97-AF65-F5344CB8AC3E}">
-        <p14:creationId xmlns:p14="http://schemas.microsoft.com/office/powerpoint/2010/main" val="525268256"/>
+        <p14:creationId xmlns:p14="http://schemas.microsoft.com/office/powerpoint/2010/main" val="1809420739"/>
       </p:ext>
     </p:extLst>
   </p:cSld>
@@ -5072,8 +5106,8 @@
         </p:nvSpPr>
         <p:spPr>
           <a:xfrm>
-            <a:off x="2595562" y="3026229"/>
-            <a:ext cx="3952875" cy="805542"/>
+            <a:off x="3320715" y="1287378"/>
+            <a:ext cx="5674276" cy="4283243"/>
           </a:xfrm>
           <a:prstGeom prst="rect">
             <a:avLst/>
@@ -5101,30 +5135,84 @@
           <a:bodyPr rtlCol="0" anchor="ctr"/>
           <a:lstStyle/>
           <a:p>
-            <a:pPr algn="ctr"/>
             <a:r>
               <a:rPr lang="zh-CN" altLang="en-US" sz="3600" b="1" dirty="0">
                 <a:solidFill>
-                  <a:schemeClr val="accent1"/>
+                  <a:schemeClr val="tx1">
+                    <a:lumMod val="50000"/>
+                    <a:lumOff val="50000"/>
+                  </a:schemeClr>
                 </a:solidFill>
               </a:rPr>
-              <a:t>接下來</a:t>
+              <a:t>接下來會出現一些路徑</a:t>
             </a:r>
             <a:endParaRPr lang="en-US" altLang="zh-CN" sz="3600" b="1" dirty="0">
               <a:solidFill>
-                <a:schemeClr val="accent1"/>
+                <a:schemeClr val="tx1">
+                  <a:lumMod val="50000"/>
+                  <a:lumOff val="50000"/>
+                </a:schemeClr>
               </a:solidFill>
             </a:endParaRPr>
           </a:p>
           <a:p>
-            <a:pPr algn="ctr"/>
             <a:r>
               <a:rPr lang="zh-CN" altLang="en-US" sz="3600" b="1" dirty="0">
                 <a:solidFill>
-                  <a:schemeClr val="accent1"/>
+                  <a:schemeClr val="tx1">
+                    <a:lumMod val="50000"/>
+                    <a:lumOff val="50000"/>
+                  </a:schemeClr>
                 </a:solidFill>
               </a:rPr>
-              <a:t>請使用</a:t>
+              <a:t>（如左圖）</a:t>
+            </a:r>
+            <a:endParaRPr lang="en-US" altLang="zh-CN" sz="3600" b="1" dirty="0">
+              <a:solidFill>
+                <a:schemeClr val="tx1">
+                  <a:lumMod val="50000"/>
+                  <a:lumOff val="50000"/>
+                </a:schemeClr>
+              </a:solidFill>
+            </a:endParaRPr>
+          </a:p>
+          <a:p>
+            <a:endParaRPr lang="en-US" altLang="zh-CN" sz="3600" b="1" dirty="0">
+              <a:solidFill>
+                <a:schemeClr val="tx1">
+                  <a:lumMod val="50000"/>
+                  <a:lumOff val="50000"/>
+                </a:schemeClr>
+              </a:solidFill>
+            </a:endParaRPr>
+          </a:p>
+          <a:p>
+            <a:r>
+              <a:rPr lang="zh-CN" altLang="en-US" sz="3600" b="1" dirty="0">
+                <a:solidFill>
+                  <a:schemeClr val="tx1">
+                    <a:lumMod val="50000"/>
+                    <a:lumOff val="50000"/>
+                  </a:schemeClr>
+                </a:solidFill>
+              </a:rPr>
+              <a:t>請利用</a:t>
+            </a:r>
+            <a:r>
+              <a:rPr lang="zh-CN" altLang="en-US" sz="3600" b="1" dirty="0">
+                <a:solidFill>
+                  <a:schemeClr val="accent2"/>
+                </a:solidFill>
+              </a:rPr>
+              <a:t>滾輪</a:t>
+            </a:r>
+            <a:r>
+              <a:rPr lang="en-US" altLang="zh-TW" sz="3600" b="1" dirty="0">
+                <a:solidFill>
+                  <a:schemeClr val="accent2"/>
+                </a:solidFill>
+              </a:rPr>
+              <a:t>/</a:t>
             </a:r>
             <a:r>
               <a:rPr lang="zh-CN" altLang="en-US" sz="3600" b="1" dirty="0">
@@ -5137,23 +5225,581 @@
             <a:r>
               <a:rPr lang="zh-CN" altLang="en-US" sz="3600" b="1" dirty="0">
                 <a:solidFill>
-                  <a:schemeClr val="accent1"/>
+                  <a:schemeClr val="tx1">
+                    <a:lumMod val="50000"/>
+                    <a:lumOff val="50000"/>
+                  </a:schemeClr>
                 </a:solidFill>
               </a:rPr>
-              <a:t>作答</a:t>
+              <a:t>來操作前進</a:t>
+            </a:r>
+            <a:r>
+              <a:rPr lang="zh-CN" altLang="en-US" sz="3600" b="1" dirty="0">
+                <a:solidFill>
+                  <a:schemeClr val="accent2"/>
+                </a:solidFill>
+              </a:rPr>
+              <a:t>方向</a:t>
+            </a:r>
+            <a:r>
+              <a:rPr lang="zh-CN" altLang="en-US" sz="3600" b="1" dirty="0">
+                <a:solidFill>
+                  <a:schemeClr val="tx1">
+                    <a:lumMod val="50000"/>
+                    <a:lumOff val="50000"/>
+                  </a:schemeClr>
+                </a:solidFill>
+              </a:rPr>
+              <a:t>，盡量快速地沿著路徑走到終點</a:t>
             </a:r>
             <a:endParaRPr lang="en-US" altLang="zh-CN" sz="3600" b="1" dirty="0">
               <a:solidFill>
-                <a:schemeClr val="accent1"/>
+                <a:schemeClr val="tx1">
+                  <a:lumMod val="50000"/>
+                  <a:lumOff val="50000"/>
+                </a:schemeClr>
               </a:solidFill>
             </a:endParaRPr>
           </a:p>
         </p:txBody>
       </p:sp>
+      <p:pic>
+        <p:nvPicPr>
+          <p:cNvPr id="6" name="Picture 5" descr="A close up of a sign&#10;&#10;Description automatically generated">
+            <a:extLst>
+              <a:ext uri="{FF2B5EF4-FFF2-40B4-BE49-F238E27FC236}">
+                <a16:creationId xmlns:a16="http://schemas.microsoft.com/office/drawing/2014/main" id="{46CEEACC-2C40-304D-953B-738AB6331121}"/>
+              </a:ext>
+            </a:extLst>
+          </p:cNvPr>
+          <p:cNvPicPr>
+            <a:picLocks noChangeAspect="1"/>
+          </p:cNvPicPr>
+          <p:nvPr/>
+        </p:nvPicPr>
+        <p:blipFill>
+          <a:blip r:embed="rId2"/>
+          <a:stretch>
+            <a:fillRect/>
+          </a:stretch>
+        </p:blipFill>
+        <p:spPr>
+          <a:xfrm>
+            <a:off x="149009" y="2424927"/>
+            <a:ext cx="3012218" cy="2008145"/>
+          </a:xfrm>
+          <a:prstGeom prst="rect">
+            <a:avLst/>
+          </a:prstGeom>
+        </p:spPr>
+      </p:pic>
     </p:spTree>
     <p:extLst>
       <p:ext uri="{BB962C8B-B14F-4D97-AF65-F5344CB8AC3E}">
-        <p14:creationId xmlns:p14="http://schemas.microsoft.com/office/powerpoint/2010/main" val="1809420739"/>
+        <p14:creationId xmlns:p14="http://schemas.microsoft.com/office/powerpoint/2010/main" val="672728325"/>
+      </p:ext>
+    </p:extLst>
+  </p:cSld>
+  <p:clrMapOvr>
+    <a:masterClrMapping/>
+  </p:clrMapOvr>
+</p:sld>
+</file>
+
+<file path=ppt/slides/slide23.xml><?xml version="1.0" encoding="utf-8"?>
+<p:sld xmlns:a="http://schemas.openxmlformats.org/drawingml/2006/main" xmlns:r="http://schemas.openxmlformats.org/officeDocument/2006/relationships" xmlns:p="http://schemas.openxmlformats.org/presentationml/2006/main">
+  <p:cSld>
+    <p:spTree>
+      <p:nvGrpSpPr>
+        <p:cNvPr id="1" name=""/>
+        <p:cNvGrpSpPr/>
+        <p:nvPr/>
+      </p:nvGrpSpPr>
+      <p:grpSpPr>
+        <a:xfrm>
+          <a:off x="0" y="0"/>
+          <a:ext cx="0" cy="0"/>
+          <a:chOff x="0" y="0"/>
+          <a:chExt cx="0" cy="0"/>
+        </a:xfrm>
+      </p:grpSpPr>
+      <p:sp>
+        <p:nvSpPr>
+          <p:cNvPr id="5" name="Rectangle 4">
+            <a:extLst>
+              <a:ext uri="{FF2B5EF4-FFF2-40B4-BE49-F238E27FC236}">
+                <a16:creationId xmlns:a16="http://schemas.microsoft.com/office/drawing/2014/main" id="{EE2EB717-B67C-504D-AE5F-13E7BAD2FD25}"/>
+              </a:ext>
+            </a:extLst>
+          </p:cNvPr>
+          <p:cNvSpPr/>
+          <p:nvPr/>
+        </p:nvSpPr>
+        <p:spPr>
+          <a:xfrm>
+            <a:off x="3552270" y="1346200"/>
+            <a:ext cx="5265967" cy="1136697"/>
+          </a:xfrm>
+          <a:prstGeom prst="rect">
+            <a:avLst/>
+          </a:prstGeom>
+          <a:noFill/>
+          <a:ln>
+            <a:noFill/>
+          </a:ln>
+        </p:spPr>
+        <p:style>
+          <a:lnRef idx="1">
+            <a:schemeClr val="accent3"/>
+          </a:lnRef>
+          <a:fillRef idx="2">
+            <a:schemeClr val="accent3"/>
+          </a:fillRef>
+          <a:effectRef idx="1">
+            <a:schemeClr val="accent3"/>
+          </a:effectRef>
+          <a:fontRef idx="minor">
+            <a:schemeClr val="dk1"/>
+          </a:fontRef>
+        </p:style>
+        <p:txBody>
+          <a:bodyPr rtlCol="0" anchor="ctr"/>
+          <a:lstStyle/>
+          <a:p>
+            <a:r>
+              <a:rPr lang="zh-CN" altLang="en-US" sz="3600" b="1" dirty="0">
+                <a:solidFill>
+                  <a:schemeClr val="accent6"/>
+                </a:solidFill>
+              </a:rPr>
+              <a:t>綠色線段</a:t>
+            </a:r>
+            <a:r>
+              <a:rPr lang="zh-CN" altLang="en-US" sz="3600" b="1" dirty="0">
+                <a:solidFill>
+                  <a:schemeClr val="tx1">
+                    <a:lumMod val="50000"/>
+                    <a:lumOff val="50000"/>
+                  </a:schemeClr>
+                </a:solidFill>
+              </a:rPr>
+              <a:t>代表：</a:t>
+            </a:r>
+            <a:endParaRPr lang="en-US" altLang="zh-CN" sz="3600" b="1" dirty="0">
+              <a:solidFill>
+                <a:schemeClr val="tx1">
+                  <a:lumMod val="50000"/>
+                  <a:lumOff val="50000"/>
+                </a:schemeClr>
+              </a:solidFill>
+            </a:endParaRPr>
+          </a:p>
+          <a:p>
+            <a:r>
+              <a:rPr lang="zh-CN" altLang="en-US" sz="3600" b="1" dirty="0">
+                <a:solidFill>
+                  <a:schemeClr val="tx1">
+                    <a:lumMod val="50000"/>
+                    <a:lumOff val="50000"/>
+                  </a:schemeClr>
+                </a:solidFill>
+              </a:rPr>
+              <a:t>已經</a:t>
+            </a:r>
+            <a:r>
+              <a:rPr lang="zh-CN" altLang="en-US" sz="3600" b="1" dirty="0">
+                <a:solidFill>
+                  <a:schemeClr val="accent6"/>
+                </a:solidFill>
+              </a:rPr>
+              <a:t>正確</a:t>
+            </a:r>
+            <a:r>
+              <a:rPr lang="zh-CN" altLang="en-US" sz="3600" b="1" dirty="0">
+                <a:solidFill>
+                  <a:schemeClr val="tx1">
+                    <a:lumMod val="50000"/>
+                    <a:lumOff val="50000"/>
+                  </a:schemeClr>
+                </a:solidFill>
+              </a:rPr>
+              <a:t>走過的路徑</a:t>
+            </a:r>
+            <a:endParaRPr lang="en-US" altLang="zh-CN" sz="3600" b="1" dirty="0">
+              <a:solidFill>
+                <a:schemeClr val="tx1">
+                  <a:lumMod val="50000"/>
+                  <a:lumOff val="50000"/>
+                </a:schemeClr>
+              </a:solidFill>
+            </a:endParaRPr>
+          </a:p>
+        </p:txBody>
+      </p:sp>
+      <p:sp>
+        <p:nvSpPr>
+          <p:cNvPr id="6" name="Rectangle 5">
+            <a:extLst>
+              <a:ext uri="{FF2B5EF4-FFF2-40B4-BE49-F238E27FC236}">
+                <a16:creationId xmlns:a16="http://schemas.microsoft.com/office/drawing/2014/main" id="{737DEDB5-529E-2B49-8C66-7077E6530F9D}"/>
+              </a:ext>
+            </a:extLst>
+          </p:cNvPr>
+          <p:cNvSpPr/>
+          <p:nvPr/>
+        </p:nvSpPr>
+        <p:spPr>
+          <a:xfrm>
+            <a:off x="3552270" y="4706258"/>
+            <a:ext cx="5265967" cy="805542"/>
+          </a:xfrm>
+          <a:prstGeom prst="rect">
+            <a:avLst/>
+          </a:prstGeom>
+          <a:noFill/>
+          <a:ln>
+            <a:noFill/>
+          </a:ln>
+        </p:spPr>
+        <p:style>
+          <a:lnRef idx="1">
+            <a:schemeClr val="accent3"/>
+          </a:lnRef>
+          <a:fillRef idx="2">
+            <a:schemeClr val="accent3"/>
+          </a:fillRef>
+          <a:effectRef idx="1">
+            <a:schemeClr val="accent3"/>
+          </a:effectRef>
+          <a:fontRef idx="minor">
+            <a:schemeClr val="dk1"/>
+          </a:fontRef>
+        </p:style>
+        <p:txBody>
+          <a:bodyPr rtlCol="0" anchor="ctr"/>
+          <a:lstStyle/>
+          <a:p>
+            <a:r>
+              <a:rPr lang="zh-CN" altLang="en-US" sz="3600" b="1" dirty="0">
+                <a:solidFill>
+                  <a:srgbClr val="FF3187"/>
+                </a:solidFill>
+              </a:rPr>
+              <a:t>紅色線段</a:t>
+            </a:r>
+            <a:r>
+              <a:rPr lang="zh-CN" altLang="en-US" sz="3600" b="1" dirty="0">
+                <a:solidFill>
+                  <a:schemeClr val="tx1">
+                    <a:lumMod val="50000"/>
+                    <a:lumOff val="50000"/>
+                  </a:schemeClr>
+                </a:solidFill>
+              </a:rPr>
+              <a:t>代表：</a:t>
+            </a:r>
+            <a:endParaRPr lang="en-US" altLang="zh-CN" sz="3600" b="1" dirty="0">
+              <a:solidFill>
+                <a:schemeClr val="tx1">
+                  <a:lumMod val="50000"/>
+                  <a:lumOff val="50000"/>
+                </a:schemeClr>
+              </a:solidFill>
+            </a:endParaRPr>
+          </a:p>
+          <a:p>
+            <a:r>
+              <a:rPr lang="zh-CN" altLang="en-US" sz="3600" b="1" dirty="0">
+                <a:solidFill>
+                  <a:schemeClr val="tx1">
+                    <a:lumMod val="50000"/>
+                    <a:lumOff val="50000"/>
+                  </a:schemeClr>
+                </a:solidFill>
+              </a:rPr>
+              <a:t>剛才</a:t>
+            </a:r>
+            <a:r>
+              <a:rPr lang="zh-CN" altLang="en-US" sz="3600" b="1" dirty="0">
+                <a:solidFill>
+                  <a:srgbClr val="FF3187"/>
+                </a:solidFill>
+              </a:rPr>
+              <a:t>走錯</a:t>
+            </a:r>
+            <a:r>
+              <a:rPr lang="zh-CN" altLang="en-US" sz="3600" b="1" dirty="0">
+                <a:solidFill>
+                  <a:schemeClr val="tx1">
+                    <a:lumMod val="50000"/>
+                    <a:lumOff val="50000"/>
+                  </a:schemeClr>
+                </a:solidFill>
+              </a:rPr>
+              <a:t>方向了，</a:t>
+            </a:r>
+            <a:endParaRPr lang="en-US" altLang="zh-CN" sz="3600" b="1" dirty="0">
+              <a:solidFill>
+                <a:schemeClr val="tx1">
+                  <a:lumMod val="50000"/>
+                  <a:lumOff val="50000"/>
+                </a:schemeClr>
+              </a:solidFill>
+            </a:endParaRPr>
+          </a:p>
+          <a:p>
+            <a:r>
+              <a:rPr lang="zh-CN" altLang="en-US" sz="3600" b="1" dirty="0">
+                <a:solidFill>
+                  <a:schemeClr val="tx1">
+                    <a:lumMod val="50000"/>
+                    <a:lumOff val="50000"/>
+                  </a:schemeClr>
+                </a:solidFill>
+              </a:rPr>
+              <a:t>請修正路徑以便前進</a:t>
+            </a:r>
+            <a:endParaRPr lang="en-US" altLang="zh-CN" sz="3600" b="1" dirty="0">
+              <a:solidFill>
+                <a:schemeClr val="tx1">
+                  <a:lumMod val="50000"/>
+                  <a:lumOff val="50000"/>
+                </a:schemeClr>
+              </a:solidFill>
+            </a:endParaRPr>
+          </a:p>
+        </p:txBody>
+      </p:sp>
+      <p:pic>
+        <p:nvPicPr>
+          <p:cNvPr id="3" name="Picture 2" descr="A picture containing object, clock&#10;&#10;Description automatically generated">
+            <a:extLst>
+              <a:ext uri="{FF2B5EF4-FFF2-40B4-BE49-F238E27FC236}">
+                <a16:creationId xmlns:a16="http://schemas.microsoft.com/office/drawing/2014/main" id="{50527C67-2DE2-F842-A563-9878AA916D5D}"/>
+              </a:ext>
+            </a:extLst>
+          </p:cNvPr>
+          <p:cNvPicPr>
+            <a:picLocks noChangeAspect="1"/>
+          </p:cNvPicPr>
+          <p:nvPr/>
+        </p:nvPicPr>
+        <p:blipFill>
+          <a:blip r:embed="rId2"/>
+          <a:stretch>
+            <a:fillRect/>
+          </a:stretch>
+        </p:blipFill>
+        <p:spPr>
+          <a:xfrm>
+            <a:off x="141464" y="1752600"/>
+            <a:ext cx="3136900" cy="3352800"/>
+          </a:xfrm>
+          <a:prstGeom prst="rect">
+            <a:avLst/>
+          </a:prstGeom>
+        </p:spPr>
+      </p:pic>
+      <p:sp>
+        <p:nvSpPr>
+          <p:cNvPr id="8" name="Rectangle 7">
+            <a:extLst>
+              <a:ext uri="{FF2B5EF4-FFF2-40B4-BE49-F238E27FC236}">
+                <a16:creationId xmlns:a16="http://schemas.microsoft.com/office/drawing/2014/main" id="{766FCBEC-7CF7-2F49-8EBC-B86EB403F5B0}"/>
+              </a:ext>
+            </a:extLst>
+          </p:cNvPr>
+          <p:cNvSpPr/>
+          <p:nvPr/>
+        </p:nvSpPr>
+        <p:spPr>
+          <a:xfrm>
+            <a:off x="3552270" y="2860651"/>
+            <a:ext cx="5265967" cy="1136697"/>
+          </a:xfrm>
+          <a:prstGeom prst="rect">
+            <a:avLst/>
+          </a:prstGeom>
+          <a:noFill/>
+          <a:ln>
+            <a:noFill/>
+          </a:ln>
+        </p:spPr>
+        <p:style>
+          <a:lnRef idx="1">
+            <a:schemeClr val="accent3"/>
+          </a:lnRef>
+          <a:fillRef idx="2">
+            <a:schemeClr val="accent3"/>
+          </a:fillRef>
+          <a:effectRef idx="1">
+            <a:schemeClr val="accent3"/>
+          </a:effectRef>
+          <a:fontRef idx="minor">
+            <a:schemeClr val="dk1"/>
+          </a:fontRef>
+        </p:style>
+        <p:txBody>
+          <a:bodyPr rtlCol="0" anchor="ctr"/>
+          <a:lstStyle/>
+          <a:p>
+            <a:r>
+              <a:rPr lang="zh-CN" altLang="en-US" sz="3600" b="1" dirty="0">
+                <a:solidFill>
+                  <a:schemeClr val="accent2"/>
+                </a:solidFill>
+              </a:rPr>
+              <a:t>黃色圓點</a:t>
+            </a:r>
+            <a:r>
+              <a:rPr lang="zh-CN" altLang="en-US" sz="3600" b="1" dirty="0">
+                <a:solidFill>
+                  <a:schemeClr val="tx1">
+                    <a:lumMod val="50000"/>
+                    <a:lumOff val="50000"/>
+                  </a:schemeClr>
+                </a:solidFill>
+              </a:rPr>
+              <a:t>代表：</a:t>
+            </a:r>
+            <a:endParaRPr lang="en-US" altLang="zh-CN" sz="3600" b="1" dirty="0">
+              <a:solidFill>
+                <a:schemeClr val="tx1">
+                  <a:lumMod val="50000"/>
+                  <a:lumOff val="50000"/>
+                </a:schemeClr>
+              </a:solidFill>
+            </a:endParaRPr>
+          </a:p>
+          <a:p>
+            <a:r>
+              <a:rPr lang="zh-CN" altLang="en-US" sz="3600" b="1" dirty="0">
+                <a:solidFill>
+                  <a:schemeClr val="accent2"/>
+                </a:solidFill>
+              </a:rPr>
+              <a:t>目前</a:t>
+            </a:r>
+            <a:r>
+              <a:rPr lang="zh-CN" altLang="en-US" sz="3600" b="1" dirty="0">
+                <a:solidFill>
+                  <a:schemeClr val="tx1">
+                    <a:lumMod val="50000"/>
+                    <a:lumOff val="50000"/>
+                  </a:schemeClr>
+                </a:solidFill>
+              </a:rPr>
+              <a:t>所在位置</a:t>
+            </a:r>
+            <a:endParaRPr lang="en-US" altLang="zh-CN" sz="3600" b="1" dirty="0">
+              <a:solidFill>
+                <a:schemeClr val="tx1">
+                  <a:lumMod val="50000"/>
+                  <a:lumOff val="50000"/>
+                </a:schemeClr>
+              </a:solidFill>
+            </a:endParaRPr>
+          </a:p>
+        </p:txBody>
+      </p:sp>
+    </p:spTree>
+    <p:extLst>
+      <p:ext uri="{BB962C8B-B14F-4D97-AF65-F5344CB8AC3E}">
+        <p14:creationId xmlns:p14="http://schemas.microsoft.com/office/powerpoint/2010/main" val="4248997078"/>
+      </p:ext>
+    </p:extLst>
+  </p:cSld>
+  <p:clrMapOvr>
+    <a:masterClrMapping/>
+  </p:clrMapOvr>
+</p:sld>
+</file>
+
+<file path=ppt/slides/slide24.xml><?xml version="1.0" encoding="utf-8"?>
+<p:sld xmlns:a="http://schemas.openxmlformats.org/drawingml/2006/main" xmlns:r="http://schemas.openxmlformats.org/officeDocument/2006/relationships" xmlns:p="http://schemas.openxmlformats.org/presentationml/2006/main">
+  <p:cSld>
+    <p:spTree>
+      <p:nvGrpSpPr>
+        <p:cNvPr id="1" name=""/>
+        <p:cNvGrpSpPr/>
+        <p:nvPr/>
+      </p:nvGrpSpPr>
+      <p:grpSpPr>
+        <a:xfrm>
+          <a:off x="0" y="0"/>
+          <a:ext cx="0" cy="0"/>
+          <a:chOff x="0" y="0"/>
+          <a:chExt cx="0" cy="0"/>
+        </a:xfrm>
+      </p:grpSpPr>
+      <p:sp>
+        <p:nvSpPr>
+          <p:cNvPr id="5" name="Rectangle 4">
+            <a:extLst>
+              <a:ext uri="{FF2B5EF4-FFF2-40B4-BE49-F238E27FC236}">
+                <a16:creationId xmlns:a16="http://schemas.microsoft.com/office/drawing/2014/main" id="{EE2EB717-B67C-504D-AE5F-13E7BAD2FD25}"/>
+              </a:ext>
+            </a:extLst>
+          </p:cNvPr>
+          <p:cNvSpPr/>
+          <p:nvPr/>
+        </p:nvSpPr>
+        <p:spPr>
+          <a:xfrm>
+            <a:off x="2590800" y="3026229"/>
+            <a:ext cx="3777916" cy="805542"/>
+          </a:xfrm>
+          <a:prstGeom prst="rect">
+            <a:avLst/>
+          </a:prstGeom>
+          <a:noFill/>
+          <a:ln>
+            <a:noFill/>
+          </a:ln>
+        </p:spPr>
+        <p:style>
+          <a:lnRef idx="1">
+            <a:schemeClr val="accent3"/>
+          </a:lnRef>
+          <a:fillRef idx="2">
+            <a:schemeClr val="accent3"/>
+          </a:fillRef>
+          <a:effectRef idx="1">
+            <a:schemeClr val="accent3"/>
+          </a:effectRef>
+          <a:fontRef idx="minor">
+            <a:schemeClr val="dk1"/>
+          </a:fontRef>
+        </p:style>
+        <p:txBody>
+          <a:bodyPr rtlCol="0" anchor="ctr"/>
+          <a:lstStyle/>
+          <a:p>
+            <a:pPr algn="ctr"/>
+            <a:r>
+              <a:rPr lang="zh-CN" altLang="en-US" sz="3600" b="1" dirty="0">
+                <a:solidFill>
+                  <a:schemeClr val="accent5">
+                    <a:lumMod val="75000"/>
+                  </a:schemeClr>
+                </a:solidFill>
+              </a:rPr>
+              <a:t>很好！</a:t>
+            </a:r>
+            <a:endParaRPr lang="en-US" altLang="zh-CN" sz="3600" b="1" dirty="0">
+              <a:solidFill>
+                <a:schemeClr val="accent5">
+                  <a:lumMod val="75000"/>
+                </a:schemeClr>
+              </a:solidFill>
+            </a:endParaRPr>
+          </a:p>
+        </p:txBody>
+      </p:sp>
+    </p:spTree>
+    <p:extLst>
+      <p:ext uri="{BB962C8B-B14F-4D97-AF65-F5344CB8AC3E}">
+        <p14:creationId xmlns:p14="http://schemas.microsoft.com/office/powerpoint/2010/main" val="3795229706"/>
       </p:ext>
     </p:extLst>
   </p:cSld>

</xml_diff>